<commit_message>
Few changes done during demo
</commit_message>
<xml_diff>
--- a/DEPENDENCY INJECTION.pptx
+++ b/DEPENDENCY INJECTION.pptx
@@ -5,27 +5,26 @@
     <p:sldMasterId id="2147483660" r:id="rId1"/>
   </p:sldMasterIdLst>
   <p:notesMasterIdLst>
-    <p:notesMasterId r:id="rId17"/>
+    <p:notesMasterId r:id="rId16"/>
   </p:notesMasterIdLst>
   <p:handoutMasterIdLst>
-    <p:handoutMasterId r:id="rId18"/>
+    <p:handoutMasterId r:id="rId17"/>
   </p:handoutMasterIdLst>
   <p:sldIdLst>
     <p:sldId id="256" r:id="rId2"/>
     <p:sldId id="281" r:id="rId3"/>
     <p:sldId id="297" r:id="rId4"/>
     <p:sldId id="295" r:id="rId5"/>
-    <p:sldId id="291" r:id="rId6"/>
-    <p:sldId id="298" r:id="rId7"/>
-    <p:sldId id="293" r:id="rId8"/>
-    <p:sldId id="283" r:id="rId9"/>
-    <p:sldId id="296" r:id="rId10"/>
-    <p:sldId id="299" r:id="rId11"/>
-    <p:sldId id="284" r:id="rId12"/>
-    <p:sldId id="302" r:id="rId13"/>
-    <p:sldId id="301" r:id="rId14"/>
-    <p:sldId id="300" r:id="rId15"/>
-    <p:sldId id="282" r:id="rId16"/>
+    <p:sldId id="283" r:id="rId6"/>
+    <p:sldId id="291" r:id="rId7"/>
+    <p:sldId id="298" r:id="rId8"/>
+    <p:sldId id="296" r:id="rId9"/>
+    <p:sldId id="299" r:id="rId10"/>
+    <p:sldId id="284" r:id="rId11"/>
+    <p:sldId id="302" r:id="rId12"/>
+    <p:sldId id="301" r:id="rId13"/>
+    <p:sldId id="300" r:id="rId14"/>
+    <p:sldId id="282" r:id="rId15"/>
   </p:sldIdLst>
   <p:sldSz cx="12192000" cy="6858000"/>
   <p:notesSz cx="6858000" cy="9144000"/>
@@ -137,10 +136,9 @@
             <p14:sldId id="281"/>
             <p14:sldId id="297"/>
             <p14:sldId id="295"/>
+            <p14:sldId id="283"/>
             <p14:sldId id="291"/>
             <p14:sldId id="298"/>
-            <p14:sldId id="293"/>
-            <p14:sldId id="283"/>
           </p14:sldIdLst>
         </p14:section>
         <p14:section name="Implementation" id="{B9B51309-D148-4332-87C2-07BE32FBCA3B}">
@@ -273,7 +271,7 @@
           <a:p>
             <a:fld id="{80680FBE-A8DF-4758-9AC4-3A9E1039168F}" type="datetimeFigureOut">
               <a:rPr lang="en-US" smtClean="0"/>
-              <a:t>24/09/2022</a:t>
+              <a:t>26/09/2022</a:t>
             </a:fld>
             <a:endParaRPr lang="en-US" dirty="0"/>
           </a:p>
@@ -438,7 +436,7 @@
           <a:p>
             <a:fld id="{EC13577B-6902-467D-A26C-08A0DD5E4E03}" type="datetimeFigureOut">
               <a:rPr lang="en-US" smtClean="0"/>
-              <a:t>24/09/2022</a:t>
+              <a:t>26/09/2022</a:t>
             </a:fld>
             <a:endParaRPr lang="en-US" dirty="0"/>
           </a:p>
@@ -864,7 +862,7 @@
           <a:p>
             <a:fld id="{DF61EA0F-A667-4B49-8422-0062BC55E249}" type="slidenum">
               <a:rPr lang="en-US" smtClean="0"/>
-              <a:t>15</a:t>
+              <a:t>14</a:t>
             </a:fld>
             <a:endParaRPr lang="en-US" dirty="0"/>
           </a:p>
@@ -1322,7 +1320,7 @@
             <a:fld id="{8BEEBAAA-29B5-4AF5-BC5F-7E580C29002D}" type="datetimeFigureOut">
               <a:rPr lang="en-US" smtClean="0"/>
               <a:pPr/>
-              <a:t>24/09/2022</a:t>
+              <a:t>26/09/2022</a:t>
             </a:fld>
             <a:endParaRPr lang="en-US" dirty="0"/>
           </a:p>
@@ -1948,7 +1946,7 @@
             <a:fld id="{8BEEBAAA-29B5-4AF5-BC5F-7E580C29002D}" type="datetimeFigureOut">
               <a:rPr lang="en-US" smtClean="0"/>
               <a:pPr/>
-              <a:t>24/09/2022</a:t>
+              <a:t>26/09/2022</a:t>
             </a:fld>
             <a:endParaRPr lang="en-US" dirty="0"/>
           </a:p>
@@ -2759,263 +2757,6 @@
       </p:grpSpPr>
       <p:sp>
         <p:nvSpPr>
-          <p:cNvPr id="6" name="Title 5"/>
-          <p:cNvSpPr>
-            <a:spLocks noGrp="1"/>
-          </p:cNvSpPr>
-          <p:nvPr>
-            <p:ph type="title"/>
-          </p:nvPr>
-        </p:nvSpPr>
-        <p:spPr/>
-        <p:txBody>
-          <a:bodyPr/>
-          <a:lstStyle/>
-          <a:p>
-            <a:r>
-              <a:rPr lang="en-US" dirty="0">
-                <a:latin typeface="Segoe UI Light" panose="020B0502040204020203" pitchFamily="34" charset="0"/>
-                <a:cs typeface="Segoe UI Light" panose="020B0502040204020203" pitchFamily="34" charset="0"/>
-              </a:rPr>
-              <a:t>DEMO</a:t>
-            </a:r>
-          </a:p>
-        </p:txBody>
-      </p:sp>
-      <p:pic>
-        <p:nvPicPr>
-          <p:cNvPr id="24" name="Picture 23">
-            <a:extLst>
-              <a:ext uri="{C183D7F6-B498-43B3-948B-1728B52AA6E4}">
-                <adec:decorative xmlns:adec="http://schemas.microsoft.com/office/drawing/2017/decorative" val="1"/>
-              </a:ext>
-            </a:extLst>
-          </p:cNvPr>
-          <p:cNvPicPr/>
-          <p:nvPr/>
-        </p:nvPicPr>
-        <p:blipFill>
-          <a:blip r:embed="rId2" cstate="print">
-            <a:extLst>
-              <a:ext uri="{28A0092B-C50C-407E-A947-70E740481C1C}">
-                <a14:useLocalDpi xmlns:a14="http://schemas.microsoft.com/office/drawing/2010/main" val="0"/>
-              </a:ext>
-            </a:extLst>
-          </a:blip>
-          <a:stretch>
-            <a:fillRect/>
-          </a:stretch>
-        </p:blipFill>
-        <p:spPr>
-          <a:xfrm rot="3861835" flipH="1">
-            <a:off x="3141693" y="1787378"/>
-            <a:ext cx="851862" cy="939987"/>
-          </a:xfrm>
-          <a:prstGeom prst="rect">
-            <a:avLst/>
-          </a:prstGeom>
-        </p:spPr>
-      </p:pic>
-      <p:pic>
-        <p:nvPicPr>
-          <p:cNvPr id="23" name="Picture 22" descr="Robot"/>
-          <p:cNvPicPr>
-            <a:picLocks noChangeAspect="1"/>
-          </p:cNvPicPr>
-          <p:nvPr/>
-        </p:nvPicPr>
-        <p:blipFill>
-          <a:blip r:embed="rId3"/>
-          <a:stretch>
-            <a:fillRect/>
-          </a:stretch>
-        </p:blipFill>
-        <p:spPr>
-          <a:xfrm>
-            <a:off x="4313860" y="1646170"/>
-            <a:ext cx="2775459" cy="4531804"/>
-          </a:xfrm>
-          <a:prstGeom prst="rect">
-            <a:avLst/>
-          </a:prstGeom>
-        </p:spPr>
-      </p:pic>
-      <p:sp>
-        <p:nvSpPr>
-          <p:cNvPr id="7" name="Text Box 16" descr="Select me">
-            <a:extLst>
-              <a:ext uri="{FF2B5EF4-FFF2-40B4-BE49-F238E27FC236}">
-                <a16:creationId xmlns:a16="http://schemas.microsoft.com/office/drawing/2014/main" id="{7D6C5189-85BC-2CC6-6A56-61E427E5F7D7}"/>
-              </a:ext>
-            </a:extLst>
-          </p:cNvPr>
-          <p:cNvSpPr txBox="1"/>
-          <p:nvPr/>
-        </p:nvSpPr>
-        <p:spPr>
-          <a:xfrm rot="21077122">
-            <a:off x="719447" y="1513628"/>
-            <a:ext cx="3458269" cy="1075310"/>
-          </a:xfrm>
-          <a:prstGeom prst="rect">
-            <a:avLst/>
-          </a:prstGeom>
-          <a:noFill/>
-          <a:ln>
-            <a:noFill/>
-          </a:ln>
-          <a:effectLst/>
-          <a:extLst>
-            <a:ext uri="{C572A759-6A51-4108-AA02-DFA0A04FC94B}">
-              <ma14:wrappingTextBoxFlag xmlns="" xmlns:ma14="http://schemas.microsoft.com/office/mac/drawingml/2011/main"/>
-            </a:ext>
-          </a:extLst>
-        </p:spPr>
-        <p:txBody>
-          <a:bodyPr rot="0" spcFirstLastPara="0" vert="horz" wrap="none" lIns="91440" tIns="45720" rIns="91440" bIns="45720" numCol="1" spcCol="0" rtlCol="0" fromWordArt="0" anchor="t" anchorCtr="0" forceAA="0" compatLnSpc="1">
-            <a:prstTxWarp prst="textNoShape">
-              <a:avLst/>
-            </a:prstTxWarp>
-            <a:noAutofit/>
-          </a:bodyPr>
-          <a:lstStyle/>
-          <a:p>
-            <a:pPr marL="0" marR="0" algn="ctr">
-              <a:spcBef>
-                <a:spcPts val="0"/>
-              </a:spcBef>
-              <a:spcAft>
-                <a:spcPts val="200"/>
-              </a:spcAft>
-              <a:tabLst>
-                <a:tab pos="4931410" algn="l"/>
-              </a:tabLst>
-            </a:pPr>
-            <a:r>
-              <a:rPr lang="en-US" sz="2000" b="1" kern="1000" spc="100" dirty="0">
-                <a:solidFill>
-                  <a:srgbClr val="D24726"/>
-                </a:solidFill>
-                <a:latin typeface="Segoe UI Semibold" panose="020B0702040204020203" pitchFamily="34" charset="0"/>
-                <a:ea typeface="SimHei" panose="02010609060101010101" pitchFamily="49" charset="-122"/>
-                <a:cs typeface="Times New Roman" panose="02020603050405020304" pitchFamily="18" charset="0"/>
-              </a:rPr>
-              <a:t>I also inject colleague who </a:t>
-            </a:r>
-          </a:p>
-          <a:p>
-            <a:pPr marL="0" marR="0" algn="ctr">
-              <a:spcBef>
-                <a:spcPts val="0"/>
-              </a:spcBef>
-              <a:spcAft>
-                <a:spcPts val="200"/>
-              </a:spcAft>
-              <a:tabLst>
-                <a:tab pos="4931410" algn="l"/>
-              </a:tabLst>
-            </a:pPr>
-            <a:r>
-              <a:rPr lang="en-US" sz="2000" b="1" kern="1000" spc="100" dirty="0">
-                <a:solidFill>
-                  <a:srgbClr val="D24726"/>
-                </a:solidFill>
-                <a:latin typeface="Segoe UI Semibold" panose="020B0702040204020203" pitchFamily="34" charset="0"/>
-                <a:ea typeface="SimHei" panose="02010609060101010101" pitchFamily="49" charset="-122"/>
-                <a:cs typeface="Times New Roman" panose="02020603050405020304" pitchFamily="18" charset="0"/>
-              </a:rPr>
-              <a:t>do my work </a:t>
-            </a:r>
-          </a:p>
-        </p:txBody>
-      </p:sp>
-      <p:pic>
-        <p:nvPicPr>
-          <p:cNvPr id="4098" name="Picture 2" descr="Image result for smile emoji">
-            <a:extLst>
-              <a:ext uri="{FF2B5EF4-FFF2-40B4-BE49-F238E27FC236}">
-                <a16:creationId xmlns:a16="http://schemas.microsoft.com/office/drawing/2014/main" id="{F6DC26A0-56E1-AAEF-E0CD-9751EA181FD4}"/>
-              </a:ext>
-            </a:extLst>
-          </p:cNvPr>
-          <p:cNvPicPr>
-            <a:picLocks noChangeAspect="1" noChangeArrowheads="1"/>
-          </p:cNvPicPr>
-          <p:nvPr/>
-        </p:nvPicPr>
-        <p:blipFill>
-          <a:blip r:embed="rId4">
-            <a:extLst>
-              <a:ext uri="{28A0092B-C50C-407E-A947-70E740481C1C}">
-                <a14:useLocalDpi xmlns:a14="http://schemas.microsoft.com/office/drawing/2010/main" val="0"/>
-              </a:ext>
-            </a:extLst>
-          </a:blip>
-          <a:srcRect/>
-          <a:stretch>
-            <a:fillRect/>
-          </a:stretch>
-        </p:blipFill>
-        <p:spPr bwMode="auto">
-          <a:xfrm>
-            <a:off x="2104345" y="2349878"/>
-            <a:ext cx="989681" cy="989681"/>
-          </a:xfrm>
-          <a:prstGeom prst="rect">
-            <a:avLst/>
-          </a:prstGeom>
-          <a:noFill/>
-          <a:extLst>
-            <a:ext uri="{909E8E84-426E-40DD-AFC4-6F175D3DCCD1}">
-              <a14:hiddenFill xmlns:a14="http://schemas.microsoft.com/office/drawing/2010/main">
-                <a:solidFill>
-                  <a:srgbClr val="FFFFFF"/>
-                </a:solidFill>
-              </a14:hiddenFill>
-            </a:ext>
-          </a:extLst>
-        </p:spPr>
-      </p:pic>
-    </p:spTree>
-    <p:extLst>
-      <p:ext uri="{BB962C8B-B14F-4D97-AF65-F5344CB8AC3E}">
-        <p14:creationId xmlns:p14="http://schemas.microsoft.com/office/powerpoint/2010/main" val="1195684305"/>
-      </p:ext>
-    </p:extLst>
-  </p:cSld>
-  <p:clrMapOvr>
-    <a:masterClrMapping/>
-  </p:clrMapOvr>
-  <mc:AlternateContent xmlns:mc="http://schemas.openxmlformats.org/markup-compatibility/2006" xmlns:p14="http://schemas.microsoft.com/office/powerpoint/2010/main">
-    <mc:Choice Requires="p14">
-      <p:transition p14:dur="10"/>
-    </mc:Choice>
-    <mc:Fallback xmlns="">
-      <p:transition/>
-    </mc:Fallback>
-  </mc:AlternateContent>
-</p:sld>
-</file>
-
-<file path=ppt/slides/slide11.xml><?xml version="1.0" encoding="utf-8"?>
-<p:sld xmlns:a="http://schemas.openxmlformats.org/drawingml/2006/main" xmlns:r="http://schemas.openxmlformats.org/officeDocument/2006/relationships" xmlns:p="http://schemas.openxmlformats.org/presentationml/2006/main">
-  <p:cSld>
-    <p:spTree>
-      <p:nvGrpSpPr>
-        <p:cNvPr id="1" name=""/>
-        <p:cNvGrpSpPr/>
-        <p:nvPr/>
-      </p:nvGrpSpPr>
-      <p:grpSpPr>
-        <a:xfrm>
-          <a:off x="0" y="0"/>
-          <a:ext cx="0" cy="0"/>
-          <a:chOff x="0" y="0"/>
-          <a:chExt cx="0" cy="0"/>
-        </a:xfrm>
-      </p:grpSpPr>
-      <p:sp>
-        <p:nvSpPr>
           <p:cNvPr id="8" name="Title 7"/>
           <p:cNvSpPr>
             <a:spLocks noGrp="1"/>
@@ -3573,7 +3314,7 @@
 </p:sld>
 </file>
 
-<file path=ppt/slides/slide12.xml><?xml version="1.0" encoding="utf-8"?>
+<file path=ppt/slides/slide11.xml><?xml version="1.0" encoding="utf-8"?>
 <p:sld xmlns:a="http://schemas.openxmlformats.org/drawingml/2006/main" xmlns:r="http://schemas.openxmlformats.org/officeDocument/2006/relationships" xmlns:p="http://schemas.openxmlformats.org/presentationml/2006/main">
   <p:cSld>
     <p:spTree>
@@ -4096,7 +3837,7 @@
 </p:sld>
 </file>
 
-<file path=ppt/slides/slide13.xml><?xml version="1.0" encoding="utf-8"?>
+<file path=ppt/slides/slide12.xml><?xml version="1.0" encoding="utf-8"?>
 <p:sld xmlns:a="http://schemas.openxmlformats.org/drawingml/2006/main" xmlns:r="http://schemas.openxmlformats.org/officeDocument/2006/relationships" xmlns:p="http://schemas.openxmlformats.org/presentationml/2006/main">
   <p:cSld>
     <p:spTree>
@@ -4567,7 +4308,7 @@
 </p:sld>
 </file>
 
-<file path=ppt/slides/slide14.xml><?xml version="1.0" encoding="utf-8"?>
+<file path=ppt/slides/slide13.xml><?xml version="1.0" encoding="utf-8"?>
 <p:sld xmlns:a="http://schemas.openxmlformats.org/drawingml/2006/main" xmlns:r="http://schemas.openxmlformats.org/officeDocument/2006/relationships" xmlns:p="http://schemas.openxmlformats.org/presentationml/2006/main">
   <p:cSld>
     <p:spTree>
@@ -4681,7 +4422,7 @@
         </p:nvSpPr>
         <p:spPr>
           <a:xfrm rot="21077122">
-            <a:off x="842553" y="1768521"/>
+            <a:off x="842553" y="1534142"/>
             <a:ext cx="3458269" cy="435610"/>
           </a:xfrm>
           <a:prstGeom prst="rect">
@@ -4723,15 +4464,14 @@
                 <a:solidFill>
                   <a:srgbClr val="D24726"/>
                 </a:solidFill>
-                <a:effectLst/>
                 <a:latin typeface="Segoe UI Semibold" panose="020B0702040204020203" pitchFamily="34" charset="0"/>
                 <a:ea typeface="SimHei" panose="02010609060101010101" pitchFamily="49" charset="-122"/>
                 <a:cs typeface="Times New Roman" panose="02020603050405020304" pitchFamily="18" charset="0"/>
               </a:rPr>
-              <a:t>Is this Automati</a:t>
-            </a:r>
-            <a:r>
-              <a:rPr lang="en-US" sz="2000" b="1" kern="1000" spc="100" dirty="0">
+              <a:t>Bhai, </a:t>
+            </a:r>
+            <a:r>
+              <a:rPr lang="en-US" sz="2000" b="1" kern="1000" spc="100" dirty="0" err="1">
                 <a:solidFill>
                   <a:srgbClr val="D24726"/>
                 </a:solidFill>
@@ -4739,7 +4479,84 @@
                 <a:ea typeface="SimHei" panose="02010609060101010101" pitchFamily="49" charset="-122"/>
                 <a:cs typeface="Times New Roman" panose="02020603050405020304" pitchFamily="18" charset="0"/>
               </a:rPr>
-              <a:t>on?</a:t>
+              <a:t>abhi</a:t>
+            </a:r>
+            <a:r>
+              <a:rPr lang="en-US" sz="2000" b="1" kern="1000" spc="100" dirty="0">
+                <a:solidFill>
+                  <a:srgbClr val="D24726"/>
+                </a:solidFill>
+                <a:latin typeface="Segoe UI Semibold" panose="020B0702040204020203" pitchFamily="34" charset="0"/>
+                <a:ea typeface="SimHei" panose="02010609060101010101" pitchFamily="49" charset="-122"/>
+                <a:cs typeface="Times New Roman" panose="02020603050405020304" pitchFamily="18" charset="0"/>
+              </a:rPr>
+              <a:t> to </a:t>
+            </a:r>
+            <a:r>
+              <a:rPr lang="en-US" sz="2000" b="1" kern="1000" spc="100" dirty="0" err="1">
+                <a:solidFill>
+                  <a:srgbClr val="D24726"/>
+                </a:solidFill>
+                <a:latin typeface="Segoe UI Semibold" panose="020B0702040204020203" pitchFamily="34" charset="0"/>
+                <a:ea typeface="SimHei" panose="02010609060101010101" pitchFamily="49" charset="-122"/>
+                <a:cs typeface="Times New Roman" panose="02020603050405020304" pitchFamily="18" charset="0"/>
+              </a:rPr>
+              <a:t>taiyar</a:t>
+            </a:r>
+            <a:r>
+              <a:rPr lang="en-US" sz="2000" b="1" kern="1000" spc="100" dirty="0">
+                <a:solidFill>
+                  <a:srgbClr val="D24726"/>
+                </a:solidFill>
+                <a:latin typeface="Segoe UI Semibold" panose="020B0702040204020203" pitchFamily="34" charset="0"/>
+                <a:ea typeface="SimHei" panose="02010609060101010101" pitchFamily="49" charset="-122"/>
+                <a:cs typeface="Times New Roman" panose="02020603050405020304" pitchFamily="18" charset="0"/>
+              </a:rPr>
+              <a:t> </a:t>
+            </a:r>
+            <a:r>
+              <a:rPr lang="en-US" sz="2000" b="1" kern="1000" spc="100" dirty="0" err="1">
+                <a:solidFill>
+                  <a:srgbClr val="D24726"/>
+                </a:solidFill>
+                <a:latin typeface="Segoe UI Semibold" panose="020B0702040204020203" pitchFamily="34" charset="0"/>
+                <a:ea typeface="SimHei" panose="02010609060101010101" pitchFamily="49" charset="-122"/>
+                <a:cs typeface="Times New Roman" panose="02020603050405020304" pitchFamily="18" charset="0"/>
+              </a:rPr>
+              <a:t>bhi</a:t>
+            </a:r>
+            <a:r>
+              <a:rPr lang="en-US" sz="2000" b="1" kern="1000" spc="100" dirty="0">
+                <a:solidFill>
+                  <a:srgbClr val="D24726"/>
+                </a:solidFill>
+                <a:latin typeface="Segoe UI Semibold" panose="020B0702040204020203" pitchFamily="34" charset="0"/>
+                <a:ea typeface="SimHei" panose="02010609060101010101" pitchFamily="49" charset="-122"/>
+                <a:cs typeface="Times New Roman" panose="02020603050405020304" pitchFamily="18" charset="0"/>
+              </a:rPr>
+              <a:t> </a:t>
+            </a:r>
+            <a:r>
+              <a:rPr lang="en-US" sz="2000" b="1" kern="1000" spc="100" dirty="0" err="1">
+                <a:solidFill>
+                  <a:srgbClr val="D24726"/>
+                </a:solidFill>
+                <a:latin typeface="Segoe UI Semibold" panose="020B0702040204020203" pitchFamily="34" charset="0"/>
+                <a:ea typeface="SimHei" panose="02010609060101010101" pitchFamily="49" charset="-122"/>
+                <a:cs typeface="Times New Roman" panose="02020603050405020304" pitchFamily="18" charset="0"/>
+              </a:rPr>
+              <a:t>hona</a:t>
+            </a:r>
+            <a:r>
+              <a:rPr lang="en-US" sz="2000" b="1" kern="1000" spc="100" dirty="0">
+                <a:solidFill>
+                  <a:srgbClr val="D24726"/>
+                </a:solidFill>
+                <a:latin typeface="Segoe UI Semibold" panose="020B0702040204020203" pitchFamily="34" charset="0"/>
+                <a:ea typeface="SimHei" panose="02010609060101010101" pitchFamily="49" charset="-122"/>
+                <a:cs typeface="Times New Roman" panose="02020603050405020304" pitchFamily="18" charset="0"/>
+              </a:rPr>
+              <a:t> he</a:t>
             </a:r>
             <a:endParaRPr lang="en-US" sz="2000" b="1" kern="1400" dirty="0">
               <a:solidFill>
@@ -4774,7 +4591,7 @@
 </p:sld>
 </file>
 
-<file path=ppt/slides/slide15.xml><?xml version="1.0" encoding="utf-8"?>
+<file path=ppt/slides/slide14.xml><?xml version="1.0" encoding="utf-8"?>
 <p:sld xmlns:a="http://schemas.openxmlformats.org/drawingml/2006/main" xmlns:r="http://schemas.openxmlformats.org/officeDocument/2006/relationships" xmlns:p="http://schemas.openxmlformats.org/presentationml/2006/main">
   <p:cSld>
     <p:spTree>
@@ -5155,7 +4972,7 @@
                 </a:solidFill>
                 <a:cs typeface="Segoe UI" panose="020B0502040204020203" pitchFamily="34" charset="0"/>
               </a:rPr>
-              <a:t>Direct Dependency:</a:t>
+              <a:t>Dependency Control Flow:</a:t>
             </a:r>
           </a:p>
           <a:p>
@@ -5226,59 +5043,6 @@
               <a:lnSpc>
                 <a:spcPts val="1800"/>
               </a:lnSpc>
-              <a:spcBef>
-                <a:spcPts val="1000"/>
-              </a:spcBef>
-              <a:spcAft>
-                <a:spcPts val="600"/>
-              </a:spcAft>
-            </a:pPr>
-            <a:r>
-              <a:rPr lang="en-US" sz="1600" dirty="0">
-                <a:solidFill>
-                  <a:schemeClr val="accent4"/>
-                </a:solidFill>
-                <a:cs typeface="Segoe UI" panose="020B0502040204020203" pitchFamily="34" charset="0"/>
-              </a:rPr>
-              <a:t>Indirect Dependency:</a:t>
-            </a:r>
-          </a:p>
-          <a:p>
-            <a:pPr>
-              <a:lnSpc>
-                <a:spcPts val="1800"/>
-              </a:lnSpc>
-              <a:spcAft>
-                <a:spcPts val="600"/>
-              </a:spcAft>
-            </a:pPr>
-            <a:r>
-              <a:rPr lang="en-US" sz="1600" b="1" dirty="0">
-                <a:solidFill>
-                  <a:srgbClr val="282829"/>
-                </a:solidFill>
-                <a:cs typeface="Segoe UI" panose="020B0502040204020203" pitchFamily="34" charset="0"/>
-              </a:rPr>
-              <a:t>Class C Depends on Class A : </a:t>
-            </a:r>
-            <a:r>
-              <a:rPr lang="en-US" sz="1600" dirty="0">
-                <a:solidFill>
-                  <a:srgbClr val="282829"/>
-                </a:solidFill>
-                <a:cs typeface="Segoe UI" panose="020B0502040204020203" pitchFamily="34" charset="0"/>
-              </a:rPr>
-              <a:t>Class A is referencing the method from Class B which further referencing a method from Class C.</a:t>
-            </a:r>
-          </a:p>
-          <a:p>
-            <a:pPr>
-              <a:lnSpc>
-                <a:spcPts val="1800"/>
-              </a:lnSpc>
-              <a:spcBef>
-                <a:spcPts val="1000"/>
-              </a:spcBef>
               <a:spcAft>
                 <a:spcPts val="600"/>
               </a:spcAft>
@@ -5794,7 +5558,7 @@
                 <a:latin typeface="Segoe UI Light" panose="020B0502040204020203" pitchFamily="34" charset="0"/>
                 <a:cs typeface="Segoe UI Light" panose="020B0502040204020203" pitchFamily="34" charset="0"/>
               </a:rPr>
-              <a:t>DEPENDENCY INJECTION - EXAMPLE</a:t>
+              <a:t>EXAMPLE</a:t>
             </a:r>
             <a:endParaRPr lang="en-US" dirty="0"/>
           </a:p>
@@ -6103,10 +5867,10 @@
       </p:pic>
       <p:pic>
         <p:nvPicPr>
-          <p:cNvPr id="7" name="Picture 6">
+          <p:cNvPr id="12" name="Picture 11">
             <a:extLst>
               <a:ext uri="{FF2B5EF4-FFF2-40B4-BE49-F238E27FC236}">
-                <a16:creationId xmlns:a16="http://schemas.microsoft.com/office/drawing/2014/main" id="{E3D88394-9266-D1D5-31F7-297BCE913E16}"/>
+                <a16:creationId xmlns:a16="http://schemas.microsoft.com/office/drawing/2014/main" id="{3C4EF6F3-05BD-CE55-CE58-462516FE4E60}"/>
               </a:ext>
             </a:extLst>
           </p:cNvPr>
@@ -6123,8 +5887,8 @@
         </p:blipFill>
         <p:spPr>
           <a:xfrm>
-            <a:off x="679548" y="1303957"/>
-            <a:ext cx="10908107" cy="2625040"/>
+            <a:off x="10145619" y="4076759"/>
+            <a:ext cx="1373680" cy="453382"/>
           </a:xfrm>
           <a:prstGeom prst="rect">
             <a:avLst/>
@@ -6133,10 +5897,10 @@
       </p:pic>
       <p:pic>
         <p:nvPicPr>
-          <p:cNvPr id="10" name="Picture 9">
+          <p:cNvPr id="11" name="Picture 10">
             <a:extLst>
               <a:ext uri="{FF2B5EF4-FFF2-40B4-BE49-F238E27FC236}">
-                <a16:creationId xmlns:a16="http://schemas.microsoft.com/office/drawing/2014/main" id="{5E781E39-7161-7E6A-52CC-7CC17F79D315}"/>
+                <a16:creationId xmlns:a16="http://schemas.microsoft.com/office/drawing/2014/main" id="{6547C1E0-3C9B-25BA-FACF-DF0150F9C154}"/>
               </a:ext>
             </a:extLst>
           </p:cNvPr>
@@ -6153,8 +5917,8 @@
         </p:blipFill>
         <p:spPr>
           <a:xfrm>
-            <a:off x="10215646" y="1316471"/>
-            <a:ext cx="1372009" cy="448788"/>
+            <a:off x="409736" y="1310080"/>
+            <a:ext cx="11090191" cy="2515069"/>
           </a:xfrm>
           <a:prstGeom prst="rect">
             <a:avLst/>
@@ -6163,10 +5927,10 @@
       </p:pic>
       <p:pic>
         <p:nvPicPr>
-          <p:cNvPr id="12" name="Picture 11">
+          <p:cNvPr id="13" name="Picture 12">
             <a:extLst>
               <a:ext uri="{FF2B5EF4-FFF2-40B4-BE49-F238E27FC236}">
-                <a16:creationId xmlns:a16="http://schemas.microsoft.com/office/drawing/2014/main" id="{3C4EF6F3-05BD-CE55-CE58-462516FE4E60}"/>
+                <a16:creationId xmlns:a16="http://schemas.microsoft.com/office/drawing/2014/main" id="{5F929F5A-23FD-4850-7973-20066F8E729B}"/>
               </a:ext>
             </a:extLst>
           </p:cNvPr>
@@ -6183,8 +5947,8 @@
         </p:blipFill>
         <p:spPr>
           <a:xfrm>
-            <a:off x="10145619" y="4076759"/>
-            <a:ext cx="1373680" cy="453382"/>
+            <a:off x="10127918" y="1310080"/>
+            <a:ext cx="1372009" cy="448788"/>
           </a:xfrm>
           <a:prstGeom prst="rect">
             <a:avLst/>
@@ -6205,6 +5969,687 @@
 </file>
 
 <file path=ppt/slides/slide5.xml><?xml version="1.0" encoding="utf-8"?>
+<p:sld xmlns:a="http://schemas.openxmlformats.org/drawingml/2006/main" xmlns:r="http://schemas.openxmlformats.org/officeDocument/2006/relationships" xmlns:p="http://schemas.openxmlformats.org/presentationml/2006/main">
+  <p:cSld>
+    <p:spTree>
+      <p:nvGrpSpPr>
+        <p:cNvPr id="1" name=""/>
+        <p:cNvGrpSpPr/>
+        <p:nvPr/>
+      </p:nvGrpSpPr>
+      <p:grpSpPr>
+        <a:xfrm>
+          <a:off x="0" y="0"/>
+          <a:ext cx="0" cy="0"/>
+          <a:chOff x="0" y="0"/>
+          <a:chExt cx="0" cy="0"/>
+        </a:xfrm>
+      </p:grpSpPr>
+      <p:sp>
+        <p:nvSpPr>
+          <p:cNvPr id="8" name="Title 7"/>
+          <p:cNvSpPr>
+            <a:spLocks noGrp="1"/>
+          </p:cNvSpPr>
+          <p:nvPr>
+            <p:ph type="title"/>
+          </p:nvPr>
+        </p:nvSpPr>
+        <p:spPr>
+          <a:xfrm>
+            <a:off x="521207" y="448056"/>
+            <a:ext cx="7658059" cy="640080"/>
+          </a:xfrm>
+        </p:spPr>
+        <p:txBody>
+          <a:bodyPr>
+            <a:noAutofit/>
+          </a:bodyPr>
+          <a:lstStyle/>
+          <a:p>
+            <a:r>
+              <a:rPr lang="en-US" dirty="0">
+                <a:latin typeface="Segoe UI Light" panose="020B0502040204020203" pitchFamily="34" charset="0"/>
+                <a:cs typeface="Segoe UI Light" panose="020B0502040204020203" pitchFamily="34" charset="0"/>
+              </a:rPr>
+              <a:t>INVERSION OF CONTROL(IoC) Principle</a:t>
+            </a:r>
+          </a:p>
+        </p:txBody>
+      </p:sp>
+      <p:sp>
+        <p:nvSpPr>
+          <p:cNvPr id="38" name="Content Placeholder 17"/>
+          <p:cNvSpPr txBox="1">
+            <a:spLocks/>
+          </p:cNvSpPr>
+          <p:nvPr/>
+        </p:nvSpPr>
+        <p:spPr>
+          <a:xfrm>
+            <a:off x="521205" y="1285570"/>
+            <a:ext cx="5032307" cy="5186486"/>
+          </a:xfrm>
+          <a:prstGeom prst="rect">
+            <a:avLst/>
+          </a:prstGeom>
+        </p:spPr>
+        <p:txBody>
+          <a:bodyPr vert="horz" lIns="91440" tIns="45720" rIns="91440" bIns="45720" rtlCol="0">
+            <a:normAutofit/>
+          </a:bodyPr>
+          <a:lstStyle>
+            <a:lvl1pPr marL="228600" indent="-228600" algn="l" defTabSz="914400" rtl="0" eaLnBrk="1" latinLnBrk="0" hangingPunct="1">
+              <a:lnSpc>
+                <a:spcPts val="1800"/>
+              </a:lnSpc>
+              <a:spcBef>
+                <a:spcPts val="1000"/>
+              </a:spcBef>
+              <a:spcAft>
+                <a:spcPts val="1000"/>
+              </a:spcAft>
+              <a:buFont typeface="Arial" panose="020B0604020202020204" pitchFamily="34" charset="0"/>
+              <a:buChar char="•"/>
+              <a:defRPr lang="en-US" sz="1200" kern="1200" smtClean="0">
+                <a:solidFill>
+                  <a:schemeClr val="tx1">
+                    <a:lumMod val="75000"/>
+                    <a:lumOff val="25000"/>
+                  </a:schemeClr>
+                </a:solidFill>
+                <a:latin typeface="+mn-lt"/>
+                <a:ea typeface="+mn-ea"/>
+                <a:cs typeface="+mn-cs"/>
+              </a:defRPr>
+            </a:lvl1pPr>
+            <a:lvl2pPr marL="685800" indent="-228600" algn="l" defTabSz="914400" rtl="0" eaLnBrk="1" latinLnBrk="0" hangingPunct="1">
+              <a:lnSpc>
+                <a:spcPts val="1800"/>
+              </a:lnSpc>
+              <a:spcBef>
+                <a:spcPts val="1000"/>
+              </a:spcBef>
+              <a:spcAft>
+                <a:spcPts val="1000"/>
+              </a:spcAft>
+              <a:buFont typeface="Arial" panose="020B0604020202020204" pitchFamily="34" charset="0"/>
+              <a:buChar char="•"/>
+              <a:defRPr lang="en-US" sz="1200" kern="1200" smtClean="0">
+                <a:solidFill>
+                  <a:schemeClr val="tx1">
+                    <a:lumMod val="75000"/>
+                    <a:lumOff val="25000"/>
+                  </a:schemeClr>
+                </a:solidFill>
+                <a:latin typeface="+mn-lt"/>
+                <a:ea typeface="+mn-ea"/>
+                <a:cs typeface="+mn-cs"/>
+              </a:defRPr>
+            </a:lvl2pPr>
+            <a:lvl3pPr marL="1143000" indent="-228600" algn="l" defTabSz="914400" rtl="0" eaLnBrk="1" latinLnBrk="0" hangingPunct="1">
+              <a:lnSpc>
+                <a:spcPts val="1800"/>
+              </a:lnSpc>
+              <a:spcBef>
+                <a:spcPts val="1000"/>
+              </a:spcBef>
+              <a:spcAft>
+                <a:spcPts val="1000"/>
+              </a:spcAft>
+              <a:buFont typeface="Arial" panose="020B0604020202020204" pitchFamily="34" charset="0"/>
+              <a:buChar char="•"/>
+              <a:defRPr lang="en-US" sz="1200" kern="1200" smtClean="0">
+                <a:solidFill>
+                  <a:schemeClr val="tx1">
+                    <a:lumMod val="75000"/>
+                    <a:lumOff val="25000"/>
+                  </a:schemeClr>
+                </a:solidFill>
+                <a:latin typeface="+mn-lt"/>
+                <a:ea typeface="+mn-ea"/>
+                <a:cs typeface="+mn-cs"/>
+              </a:defRPr>
+            </a:lvl3pPr>
+            <a:lvl4pPr marL="1600200" indent="-228600" algn="l" defTabSz="914400" rtl="0" eaLnBrk="1" latinLnBrk="0" hangingPunct="1">
+              <a:lnSpc>
+                <a:spcPts val="1800"/>
+              </a:lnSpc>
+              <a:spcBef>
+                <a:spcPts val="1000"/>
+              </a:spcBef>
+              <a:spcAft>
+                <a:spcPts val="1000"/>
+              </a:spcAft>
+              <a:buFont typeface="Arial" panose="020B0604020202020204" pitchFamily="34" charset="0"/>
+              <a:buChar char="•"/>
+              <a:defRPr lang="en-US" sz="1200" kern="1200" smtClean="0">
+                <a:solidFill>
+                  <a:schemeClr val="tx1">
+                    <a:lumMod val="75000"/>
+                    <a:lumOff val="25000"/>
+                  </a:schemeClr>
+                </a:solidFill>
+                <a:latin typeface="+mn-lt"/>
+                <a:ea typeface="+mn-ea"/>
+                <a:cs typeface="+mn-cs"/>
+              </a:defRPr>
+            </a:lvl4pPr>
+            <a:lvl5pPr marL="2057400" indent="-228600" algn="l" defTabSz="914400" rtl="0" eaLnBrk="1" latinLnBrk="0" hangingPunct="1">
+              <a:lnSpc>
+                <a:spcPts val="1800"/>
+              </a:lnSpc>
+              <a:spcBef>
+                <a:spcPts val="1000"/>
+              </a:spcBef>
+              <a:spcAft>
+                <a:spcPts val="1000"/>
+              </a:spcAft>
+              <a:buFont typeface="Arial" panose="020B0604020202020204" pitchFamily="34" charset="0"/>
+              <a:buChar char="•"/>
+              <a:defRPr lang="en-US" sz="1200" kern="1200">
+                <a:solidFill>
+                  <a:schemeClr val="tx1">
+                    <a:lumMod val="75000"/>
+                    <a:lumOff val="25000"/>
+                  </a:schemeClr>
+                </a:solidFill>
+                <a:latin typeface="+mn-lt"/>
+                <a:ea typeface="+mn-ea"/>
+                <a:cs typeface="+mn-cs"/>
+              </a:defRPr>
+            </a:lvl5pPr>
+            <a:lvl6pPr marL="2514600" indent="-228600" algn="l" defTabSz="914400" rtl="0" eaLnBrk="1" latinLnBrk="0" hangingPunct="1">
+              <a:lnSpc>
+                <a:spcPct val="90000"/>
+              </a:lnSpc>
+              <a:spcBef>
+                <a:spcPct val="30000"/>
+              </a:spcBef>
+              <a:buFont typeface="Arial" panose="020B0604020202020204" pitchFamily="34" charset="0"/>
+              <a:buChar char="•"/>
+              <a:defRPr sz="1800" kern="1200">
+                <a:solidFill>
+                  <a:schemeClr val="tx1"/>
+                </a:solidFill>
+                <a:latin typeface="+mn-lt"/>
+                <a:ea typeface="+mn-ea"/>
+                <a:cs typeface="+mn-cs"/>
+              </a:defRPr>
+            </a:lvl6pPr>
+            <a:lvl7pPr marL="2971800" indent="-228600" algn="l" defTabSz="914400" rtl="0" eaLnBrk="1" latinLnBrk="0" hangingPunct="1">
+              <a:lnSpc>
+                <a:spcPct val="90000"/>
+              </a:lnSpc>
+              <a:spcBef>
+                <a:spcPct val="30000"/>
+              </a:spcBef>
+              <a:buFont typeface="Arial" panose="020B0604020202020204" pitchFamily="34" charset="0"/>
+              <a:buChar char="•"/>
+              <a:defRPr sz="1800" kern="1200">
+                <a:solidFill>
+                  <a:schemeClr val="tx1"/>
+                </a:solidFill>
+                <a:latin typeface="+mn-lt"/>
+                <a:ea typeface="+mn-ea"/>
+                <a:cs typeface="+mn-cs"/>
+              </a:defRPr>
+            </a:lvl7pPr>
+            <a:lvl8pPr marL="3429000" indent="-228600" algn="l" defTabSz="914400" rtl="0" eaLnBrk="1" latinLnBrk="0" hangingPunct="1">
+              <a:lnSpc>
+                <a:spcPct val="90000"/>
+              </a:lnSpc>
+              <a:spcBef>
+                <a:spcPct val="30000"/>
+              </a:spcBef>
+              <a:buFont typeface="Arial" panose="020B0604020202020204" pitchFamily="34" charset="0"/>
+              <a:buChar char="•"/>
+              <a:defRPr sz="1800" kern="1200">
+                <a:solidFill>
+                  <a:schemeClr val="tx1"/>
+                </a:solidFill>
+                <a:latin typeface="+mn-lt"/>
+                <a:ea typeface="+mn-ea"/>
+                <a:cs typeface="+mn-cs"/>
+              </a:defRPr>
+            </a:lvl8pPr>
+            <a:lvl9pPr marL="3886200" indent="-228600" algn="l" defTabSz="914400" rtl="0" eaLnBrk="1" latinLnBrk="0" hangingPunct="1">
+              <a:lnSpc>
+                <a:spcPct val="90000"/>
+              </a:lnSpc>
+              <a:spcBef>
+                <a:spcPct val="30000"/>
+              </a:spcBef>
+              <a:buFont typeface="Arial" panose="020B0604020202020204" pitchFamily="34" charset="0"/>
+              <a:buChar char="•"/>
+              <a:defRPr sz="1800" kern="1200">
+                <a:solidFill>
+                  <a:schemeClr val="tx1"/>
+                </a:solidFill>
+                <a:latin typeface="+mn-lt"/>
+                <a:ea typeface="+mn-ea"/>
+                <a:cs typeface="+mn-cs"/>
+              </a:defRPr>
+            </a:lvl9pPr>
+          </a:lstStyle>
+          <a:p>
+            <a:pPr marL="0" lvl="0" indent="0">
+              <a:spcAft>
+                <a:spcPts val="600"/>
+              </a:spcAft>
+              <a:buNone/>
+              <a:defRPr/>
+            </a:pPr>
+            <a:endParaRPr lang="en-US" sz="1100" dirty="0">
+              <a:latin typeface="Segoe UI" panose="020B0502040204020203" pitchFamily="34" charset="0"/>
+              <a:cs typeface="Segoe UI" panose="020B0502040204020203" pitchFamily="34" charset="0"/>
+            </a:endParaRPr>
+          </a:p>
+          <a:p>
+            <a:pPr marL="0" lvl="0" indent="0">
+              <a:spcAft>
+                <a:spcPts val="600"/>
+              </a:spcAft>
+              <a:buNone/>
+              <a:defRPr/>
+            </a:pPr>
+            <a:endParaRPr lang="en-US" sz="1100" dirty="0">
+              <a:latin typeface="Segoe UI" panose="020B0502040204020203" pitchFamily="34" charset="0"/>
+              <a:cs typeface="Segoe UI" panose="020B0502040204020203" pitchFamily="34" charset="0"/>
+            </a:endParaRPr>
+          </a:p>
+          <a:p>
+            <a:pPr marL="0" lvl="0" indent="0">
+              <a:spcAft>
+                <a:spcPts val="600"/>
+              </a:spcAft>
+              <a:buNone/>
+              <a:defRPr/>
+            </a:pPr>
+            <a:endParaRPr lang="en-US" sz="1100" dirty="0">
+              <a:latin typeface="Segoe UI" panose="020B0502040204020203" pitchFamily="34" charset="0"/>
+              <a:cs typeface="Segoe UI" panose="020B0502040204020203" pitchFamily="34" charset="0"/>
+            </a:endParaRPr>
+          </a:p>
+        </p:txBody>
+      </p:sp>
+      <p:pic>
+        <p:nvPicPr>
+          <p:cNvPr id="1026" name="Picture 2" descr="Difference between Design Principle and Design Pattern and IoC Containers in C#">
+            <a:extLst>
+              <a:ext uri="{FF2B5EF4-FFF2-40B4-BE49-F238E27FC236}">
+                <a16:creationId xmlns:a16="http://schemas.microsoft.com/office/drawing/2014/main" id="{1D8CA53E-A75E-E5A8-F74C-DFE5165644FA}"/>
+              </a:ext>
+            </a:extLst>
+          </p:cNvPr>
+          <p:cNvPicPr>
+            <a:picLocks noChangeAspect="1" noChangeArrowheads="1"/>
+          </p:cNvPicPr>
+          <p:nvPr/>
+        </p:nvPicPr>
+        <p:blipFill>
+          <a:blip r:embed="rId2">
+            <a:extLst>
+              <a:ext uri="{28A0092B-C50C-407E-A947-70E740481C1C}">
+                <a14:useLocalDpi xmlns:a14="http://schemas.microsoft.com/office/drawing/2010/main" val="0"/>
+              </a:ext>
+            </a:extLst>
+          </a:blip>
+          <a:srcRect/>
+          <a:stretch>
+            <a:fillRect/>
+          </a:stretch>
+        </p:blipFill>
+        <p:spPr bwMode="auto">
+          <a:xfrm>
+            <a:off x="6226629" y="1757362"/>
+            <a:ext cx="5524064" cy="3343275"/>
+          </a:xfrm>
+          <a:prstGeom prst="rect">
+            <a:avLst/>
+          </a:prstGeom>
+          <a:noFill/>
+          <a:extLst>
+            <a:ext uri="{909E8E84-426E-40DD-AFC4-6F175D3DCCD1}">
+              <a14:hiddenFill xmlns:a14="http://schemas.microsoft.com/office/drawing/2010/main">
+                <a:solidFill>
+                  <a:srgbClr val="FFFFFF"/>
+                </a:solidFill>
+              </a14:hiddenFill>
+            </a:ext>
+          </a:extLst>
+        </p:spPr>
+      </p:pic>
+      <p:sp>
+        <p:nvSpPr>
+          <p:cNvPr id="7" name="Content Placeholder 17">
+            <a:extLst>
+              <a:ext uri="{FF2B5EF4-FFF2-40B4-BE49-F238E27FC236}">
+                <a16:creationId xmlns:a16="http://schemas.microsoft.com/office/drawing/2014/main" id="{6FD3624F-2716-0033-3E3E-5086D8BE7DFC}"/>
+              </a:ext>
+            </a:extLst>
+          </p:cNvPr>
+          <p:cNvSpPr txBox="1">
+            <a:spLocks/>
+          </p:cNvSpPr>
+          <p:nvPr/>
+        </p:nvSpPr>
+        <p:spPr>
+          <a:xfrm>
+            <a:off x="651835" y="1143644"/>
+            <a:ext cx="5444166" cy="5470337"/>
+          </a:xfrm>
+          <a:prstGeom prst="rect">
+            <a:avLst/>
+          </a:prstGeom>
+        </p:spPr>
+        <p:txBody>
+          <a:bodyPr vert="horz" lIns="91440" tIns="45720" rIns="91440" bIns="45720" rtlCol="0">
+            <a:normAutofit/>
+          </a:bodyPr>
+          <a:lstStyle>
+            <a:lvl1pPr marL="228600" indent="-228600" algn="l" defTabSz="914400" rtl="0" eaLnBrk="1" latinLnBrk="0" hangingPunct="1">
+              <a:lnSpc>
+                <a:spcPts val="1800"/>
+              </a:lnSpc>
+              <a:spcBef>
+                <a:spcPts val="1000"/>
+              </a:spcBef>
+              <a:spcAft>
+                <a:spcPts val="1000"/>
+              </a:spcAft>
+              <a:buFont typeface="Arial" panose="020B0604020202020204" pitchFamily="34" charset="0"/>
+              <a:buChar char="•"/>
+              <a:defRPr lang="en-US" sz="1200" kern="1200" smtClean="0">
+                <a:solidFill>
+                  <a:schemeClr val="tx1">
+                    <a:lumMod val="75000"/>
+                    <a:lumOff val="25000"/>
+                  </a:schemeClr>
+                </a:solidFill>
+                <a:latin typeface="+mn-lt"/>
+                <a:ea typeface="+mn-ea"/>
+                <a:cs typeface="+mn-cs"/>
+              </a:defRPr>
+            </a:lvl1pPr>
+            <a:lvl2pPr marL="685800" indent="-228600" algn="l" defTabSz="914400" rtl="0" eaLnBrk="1" latinLnBrk="0" hangingPunct="1">
+              <a:lnSpc>
+                <a:spcPts val="1800"/>
+              </a:lnSpc>
+              <a:spcBef>
+                <a:spcPts val="1000"/>
+              </a:spcBef>
+              <a:spcAft>
+                <a:spcPts val="1000"/>
+              </a:spcAft>
+              <a:buFont typeface="Arial" panose="020B0604020202020204" pitchFamily="34" charset="0"/>
+              <a:buChar char="•"/>
+              <a:defRPr lang="en-US" sz="1200" kern="1200" smtClean="0">
+                <a:solidFill>
+                  <a:schemeClr val="tx1">
+                    <a:lumMod val="75000"/>
+                    <a:lumOff val="25000"/>
+                  </a:schemeClr>
+                </a:solidFill>
+                <a:latin typeface="+mn-lt"/>
+                <a:ea typeface="+mn-ea"/>
+                <a:cs typeface="+mn-cs"/>
+              </a:defRPr>
+            </a:lvl2pPr>
+            <a:lvl3pPr marL="1143000" indent="-228600" algn="l" defTabSz="914400" rtl="0" eaLnBrk="1" latinLnBrk="0" hangingPunct="1">
+              <a:lnSpc>
+                <a:spcPts val="1800"/>
+              </a:lnSpc>
+              <a:spcBef>
+                <a:spcPts val="1000"/>
+              </a:spcBef>
+              <a:spcAft>
+                <a:spcPts val="1000"/>
+              </a:spcAft>
+              <a:buFont typeface="Arial" panose="020B0604020202020204" pitchFamily="34" charset="0"/>
+              <a:buChar char="•"/>
+              <a:defRPr lang="en-US" sz="1200" kern="1200" smtClean="0">
+                <a:solidFill>
+                  <a:schemeClr val="tx1">
+                    <a:lumMod val="75000"/>
+                    <a:lumOff val="25000"/>
+                  </a:schemeClr>
+                </a:solidFill>
+                <a:latin typeface="+mn-lt"/>
+                <a:ea typeface="+mn-ea"/>
+                <a:cs typeface="+mn-cs"/>
+              </a:defRPr>
+            </a:lvl3pPr>
+            <a:lvl4pPr marL="1600200" indent="-228600" algn="l" defTabSz="914400" rtl="0" eaLnBrk="1" latinLnBrk="0" hangingPunct="1">
+              <a:lnSpc>
+                <a:spcPts val="1800"/>
+              </a:lnSpc>
+              <a:spcBef>
+                <a:spcPts val="1000"/>
+              </a:spcBef>
+              <a:spcAft>
+                <a:spcPts val="1000"/>
+              </a:spcAft>
+              <a:buFont typeface="Arial" panose="020B0604020202020204" pitchFamily="34" charset="0"/>
+              <a:buChar char="•"/>
+              <a:defRPr lang="en-US" sz="1200" kern="1200" smtClean="0">
+                <a:solidFill>
+                  <a:schemeClr val="tx1">
+                    <a:lumMod val="75000"/>
+                    <a:lumOff val="25000"/>
+                  </a:schemeClr>
+                </a:solidFill>
+                <a:latin typeface="+mn-lt"/>
+                <a:ea typeface="+mn-ea"/>
+                <a:cs typeface="+mn-cs"/>
+              </a:defRPr>
+            </a:lvl4pPr>
+            <a:lvl5pPr marL="2057400" indent="-228600" algn="l" defTabSz="914400" rtl="0" eaLnBrk="1" latinLnBrk="0" hangingPunct="1">
+              <a:lnSpc>
+                <a:spcPts val="1800"/>
+              </a:lnSpc>
+              <a:spcBef>
+                <a:spcPts val="1000"/>
+              </a:spcBef>
+              <a:spcAft>
+                <a:spcPts val="1000"/>
+              </a:spcAft>
+              <a:buFont typeface="Arial" panose="020B0604020202020204" pitchFamily="34" charset="0"/>
+              <a:buChar char="•"/>
+              <a:defRPr lang="en-US" sz="1200" kern="1200">
+                <a:solidFill>
+                  <a:schemeClr val="tx1">
+                    <a:lumMod val="75000"/>
+                    <a:lumOff val="25000"/>
+                  </a:schemeClr>
+                </a:solidFill>
+                <a:latin typeface="+mn-lt"/>
+                <a:ea typeface="+mn-ea"/>
+                <a:cs typeface="+mn-cs"/>
+              </a:defRPr>
+            </a:lvl5pPr>
+            <a:lvl6pPr marL="2514600" indent="-228600" algn="l" defTabSz="914400" rtl="0" eaLnBrk="1" latinLnBrk="0" hangingPunct="1">
+              <a:lnSpc>
+                <a:spcPct val="90000"/>
+              </a:lnSpc>
+              <a:spcBef>
+                <a:spcPct val="30000"/>
+              </a:spcBef>
+              <a:buFont typeface="Arial" panose="020B0604020202020204" pitchFamily="34" charset="0"/>
+              <a:buChar char="•"/>
+              <a:defRPr sz="1800" kern="1200">
+                <a:solidFill>
+                  <a:schemeClr val="tx1"/>
+                </a:solidFill>
+                <a:latin typeface="+mn-lt"/>
+                <a:ea typeface="+mn-ea"/>
+                <a:cs typeface="+mn-cs"/>
+              </a:defRPr>
+            </a:lvl6pPr>
+            <a:lvl7pPr marL="2971800" indent="-228600" algn="l" defTabSz="914400" rtl="0" eaLnBrk="1" latinLnBrk="0" hangingPunct="1">
+              <a:lnSpc>
+                <a:spcPct val="90000"/>
+              </a:lnSpc>
+              <a:spcBef>
+                <a:spcPct val="30000"/>
+              </a:spcBef>
+              <a:buFont typeface="Arial" panose="020B0604020202020204" pitchFamily="34" charset="0"/>
+              <a:buChar char="•"/>
+              <a:defRPr sz="1800" kern="1200">
+                <a:solidFill>
+                  <a:schemeClr val="tx1"/>
+                </a:solidFill>
+                <a:latin typeface="+mn-lt"/>
+                <a:ea typeface="+mn-ea"/>
+                <a:cs typeface="+mn-cs"/>
+              </a:defRPr>
+            </a:lvl7pPr>
+            <a:lvl8pPr marL="3429000" indent="-228600" algn="l" defTabSz="914400" rtl="0" eaLnBrk="1" latinLnBrk="0" hangingPunct="1">
+              <a:lnSpc>
+                <a:spcPct val="90000"/>
+              </a:lnSpc>
+              <a:spcBef>
+                <a:spcPct val="30000"/>
+              </a:spcBef>
+              <a:buFont typeface="Arial" panose="020B0604020202020204" pitchFamily="34" charset="0"/>
+              <a:buChar char="•"/>
+              <a:defRPr sz="1800" kern="1200">
+                <a:solidFill>
+                  <a:schemeClr val="tx1"/>
+                </a:solidFill>
+                <a:latin typeface="+mn-lt"/>
+                <a:ea typeface="+mn-ea"/>
+                <a:cs typeface="+mn-cs"/>
+              </a:defRPr>
+            </a:lvl8pPr>
+            <a:lvl9pPr marL="3886200" indent="-228600" algn="l" defTabSz="914400" rtl="0" eaLnBrk="1" latinLnBrk="0" hangingPunct="1">
+              <a:lnSpc>
+                <a:spcPct val="90000"/>
+              </a:lnSpc>
+              <a:spcBef>
+                <a:spcPct val="30000"/>
+              </a:spcBef>
+              <a:buFont typeface="Arial" panose="020B0604020202020204" pitchFamily="34" charset="0"/>
+              <a:buChar char="•"/>
+              <a:defRPr sz="1800" kern="1200">
+                <a:solidFill>
+                  <a:schemeClr val="tx1"/>
+                </a:solidFill>
+                <a:latin typeface="+mn-lt"/>
+                <a:ea typeface="+mn-ea"/>
+                <a:cs typeface="+mn-cs"/>
+              </a:defRPr>
+            </a:lvl9pPr>
+          </a:lstStyle>
+          <a:p>
+            <a:pPr marL="0" lvl="0" indent="0">
+              <a:spcAft>
+                <a:spcPts val="600"/>
+              </a:spcAft>
+              <a:buNone/>
+              <a:defRPr/>
+            </a:pPr>
+            <a:endParaRPr lang="en-US" sz="1600" dirty="0">
+              <a:cs typeface="Segoe UI" panose="020B0502040204020203" pitchFamily="34" charset="0"/>
+            </a:endParaRPr>
+          </a:p>
+          <a:p>
+            <a:pPr marL="0" indent="0">
+              <a:buNone/>
+            </a:pPr>
+            <a:r>
+              <a:rPr lang="en-US" sz="1600" dirty="0">
+                <a:solidFill>
+                  <a:schemeClr val="accent4"/>
+                </a:solidFill>
+              </a:rPr>
+              <a:t>Objective:</a:t>
+            </a:r>
+          </a:p>
+          <a:p>
+            <a:r>
+              <a:rPr lang="en-US" sz="1600" dirty="0">
+                <a:solidFill>
+                  <a:schemeClr val="tx1"/>
+                </a:solidFill>
+                <a:cs typeface="Segoe UI" panose="020B0502040204020203" pitchFamily="34" charset="0"/>
+              </a:rPr>
+              <a:t>Principle suggests the inversion of various types of controls in object-oriented design to achieve loose coupling between the application classes. </a:t>
+            </a:r>
+          </a:p>
+          <a:p>
+            <a:r>
+              <a:rPr lang="en-US" sz="1600" dirty="0">
+                <a:solidFill>
+                  <a:schemeClr val="tx1"/>
+                </a:solidFill>
+                <a:cs typeface="Segoe UI" panose="020B0502040204020203" pitchFamily="34" charset="0"/>
+              </a:rPr>
+              <a:t>Here, the control means any extra responsibilities a class has other than its main or fundamental responsibility. For example, control over the flow of an application, control over the dependent object creation</a:t>
+            </a:r>
+          </a:p>
+          <a:p>
+            <a:pPr marL="0" indent="0">
+              <a:spcAft>
+                <a:spcPts val="600"/>
+              </a:spcAft>
+              <a:buNone/>
+              <a:defRPr/>
+            </a:pPr>
+            <a:r>
+              <a:rPr lang="en-US" sz="1600" dirty="0">
+                <a:solidFill>
+                  <a:schemeClr val="accent4"/>
+                </a:solidFill>
+                <a:cs typeface="Segoe UI" panose="020B0502040204020203" pitchFamily="34" charset="0"/>
+              </a:rPr>
+              <a:t>Benefit:</a:t>
+            </a:r>
+            <a:r>
+              <a:rPr lang="en-US" sz="1600" b="1" dirty="0">
+                <a:cs typeface="Segoe UI" panose="020B0502040204020203" pitchFamily="34" charset="0"/>
+              </a:rPr>
+              <a:t> </a:t>
+            </a:r>
+          </a:p>
+          <a:p>
+            <a:pPr>
+              <a:spcAft>
+                <a:spcPts val="600"/>
+              </a:spcAft>
+              <a:defRPr/>
+            </a:pPr>
+            <a:r>
+              <a:rPr lang="en-US" sz="1600" dirty="0">
+                <a:cs typeface="Segoe UI" panose="020B0502040204020203" pitchFamily="34" charset="0"/>
+              </a:rPr>
+              <a:t>Decouple components of an application.</a:t>
+            </a:r>
+          </a:p>
+        </p:txBody>
+      </p:sp>
+    </p:spTree>
+    <p:extLst>
+      <p:ext uri="{BB962C8B-B14F-4D97-AF65-F5344CB8AC3E}">
+        <p14:creationId xmlns:p14="http://schemas.microsoft.com/office/powerpoint/2010/main" val="184464248"/>
+      </p:ext>
+    </p:extLst>
+  </p:cSld>
+  <p:clrMapOvr>
+    <a:masterClrMapping/>
+  </p:clrMapOvr>
+  <mc:AlternateContent xmlns:mc="http://schemas.openxmlformats.org/markup-compatibility/2006" xmlns:p14="http://schemas.microsoft.com/office/powerpoint/2010/main">
+    <mc:Choice Requires="p14">
+      <p:transition p14:dur="10"/>
+    </mc:Choice>
+    <mc:Fallback xmlns="">
+      <p:transition/>
+    </mc:Fallback>
+  </mc:AlternateContent>
+</p:sld>
+</file>
+
+<file path=ppt/slides/slide6.xml><?xml version="1.0" encoding="utf-8"?>
 <p:sld xmlns:a="http://schemas.openxmlformats.org/drawingml/2006/main" xmlns:r="http://schemas.openxmlformats.org/officeDocument/2006/relationships" xmlns:p="http://schemas.openxmlformats.org/presentationml/2006/main">
   <p:cSld>
     <p:spTree>
@@ -6787,7 +7232,7 @@
 </p:sld>
 </file>
 
-<file path=ppt/slides/slide6.xml><?xml version="1.0" encoding="utf-8"?>
+<file path=ppt/slides/slide7.xml><?xml version="1.0" encoding="utf-8"?>
 <p:sld xmlns:a="http://schemas.openxmlformats.org/drawingml/2006/main" xmlns:r="http://schemas.openxmlformats.org/officeDocument/2006/relationships" xmlns:p="http://schemas.openxmlformats.org/presentationml/2006/main">
   <p:cSld>
     <p:spTree>
@@ -7148,7 +7593,604 @@
 </p:sld>
 </file>
 
-<file path=ppt/slides/slide7.xml><?xml version="1.0" encoding="utf-8"?>
+<file path=ppt/slides/slide8.xml><?xml version="1.0" encoding="utf-8"?>
+<p:sld xmlns:a="http://schemas.openxmlformats.org/drawingml/2006/main" xmlns:r="http://schemas.openxmlformats.org/officeDocument/2006/relationships" xmlns:p="http://schemas.openxmlformats.org/presentationml/2006/main">
+  <p:cSld>
+    <p:spTree>
+      <p:nvGrpSpPr>
+        <p:cNvPr id="1" name=""/>
+        <p:cNvGrpSpPr/>
+        <p:nvPr/>
+      </p:nvGrpSpPr>
+      <p:grpSpPr>
+        <a:xfrm>
+          <a:off x="0" y="0"/>
+          <a:ext cx="0" cy="0"/>
+          <a:chOff x="0" y="0"/>
+          <a:chExt cx="0" cy="0"/>
+        </a:xfrm>
+      </p:grpSpPr>
+      <p:sp>
+        <p:nvSpPr>
+          <p:cNvPr id="8" name="Title 7"/>
+          <p:cNvSpPr>
+            <a:spLocks noGrp="1"/>
+          </p:cNvSpPr>
+          <p:nvPr>
+            <p:ph type="title"/>
+          </p:nvPr>
+        </p:nvSpPr>
+        <p:spPr>
+          <a:xfrm>
+            <a:off x="521207" y="448056"/>
+            <a:ext cx="7658059" cy="640080"/>
+          </a:xfrm>
+        </p:spPr>
+        <p:txBody>
+          <a:bodyPr>
+            <a:noAutofit/>
+          </a:bodyPr>
+          <a:lstStyle/>
+          <a:p>
+            <a:r>
+              <a:rPr lang="en-US" dirty="0">
+                <a:latin typeface="Segoe UI Light" panose="020B0502040204020203" pitchFamily="34" charset="0"/>
+                <a:cs typeface="Segoe UI Light" panose="020B0502040204020203" pitchFamily="34" charset="0"/>
+              </a:rPr>
+              <a:t>DEPENDENCY INJECTION</a:t>
+            </a:r>
+          </a:p>
+        </p:txBody>
+      </p:sp>
+      <p:sp>
+        <p:nvSpPr>
+          <p:cNvPr id="38" name="Content Placeholder 17"/>
+          <p:cNvSpPr txBox="1">
+            <a:spLocks/>
+          </p:cNvSpPr>
+          <p:nvPr/>
+        </p:nvSpPr>
+        <p:spPr>
+          <a:xfrm>
+            <a:off x="521205" y="1285570"/>
+            <a:ext cx="5574795" cy="5470337"/>
+          </a:xfrm>
+          <a:prstGeom prst="rect">
+            <a:avLst/>
+          </a:prstGeom>
+        </p:spPr>
+        <p:txBody>
+          <a:bodyPr vert="horz" lIns="91440" tIns="45720" rIns="91440" bIns="45720" rtlCol="0">
+            <a:normAutofit fontScale="25000" lnSpcReduction="20000"/>
+          </a:bodyPr>
+          <a:lstStyle>
+            <a:lvl1pPr marL="228600" indent="-228600" algn="l" defTabSz="914400" rtl="0" eaLnBrk="1" latinLnBrk="0" hangingPunct="1">
+              <a:lnSpc>
+                <a:spcPts val="1800"/>
+              </a:lnSpc>
+              <a:spcBef>
+                <a:spcPts val="1000"/>
+              </a:spcBef>
+              <a:spcAft>
+                <a:spcPts val="1000"/>
+              </a:spcAft>
+              <a:buFont typeface="Arial" panose="020B0604020202020204" pitchFamily="34" charset="0"/>
+              <a:buChar char="•"/>
+              <a:defRPr lang="en-US" sz="1200" kern="1200" smtClean="0">
+                <a:solidFill>
+                  <a:schemeClr val="tx1">
+                    <a:lumMod val="75000"/>
+                    <a:lumOff val="25000"/>
+                  </a:schemeClr>
+                </a:solidFill>
+                <a:latin typeface="+mn-lt"/>
+                <a:ea typeface="+mn-ea"/>
+                <a:cs typeface="+mn-cs"/>
+              </a:defRPr>
+            </a:lvl1pPr>
+            <a:lvl2pPr marL="685800" indent="-228600" algn="l" defTabSz="914400" rtl="0" eaLnBrk="1" latinLnBrk="0" hangingPunct="1">
+              <a:lnSpc>
+                <a:spcPts val="1800"/>
+              </a:lnSpc>
+              <a:spcBef>
+                <a:spcPts val="1000"/>
+              </a:spcBef>
+              <a:spcAft>
+                <a:spcPts val="1000"/>
+              </a:spcAft>
+              <a:buFont typeface="Arial" panose="020B0604020202020204" pitchFamily="34" charset="0"/>
+              <a:buChar char="•"/>
+              <a:defRPr lang="en-US" sz="1200" kern="1200" smtClean="0">
+                <a:solidFill>
+                  <a:schemeClr val="tx1">
+                    <a:lumMod val="75000"/>
+                    <a:lumOff val="25000"/>
+                  </a:schemeClr>
+                </a:solidFill>
+                <a:latin typeface="+mn-lt"/>
+                <a:ea typeface="+mn-ea"/>
+                <a:cs typeface="+mn-cs"/>
+              </a:defRPr>
+            </a:lvl2pPr>
+            <a:lvl3pPr marL="1143000" indent="-228600" algn="l" defTabSz="914400" rtl="0" eaLnBrk="1" latinLnBrk="0" hangingPunct="1">
+              <a:lnSpc>
+                <a:spcPts val="1800"/>
+              </a:lnSpc>
+              <a:spcBef>
+                <a:spcPts val="1000"/>
+              </a:spcBef>
+              <a:spcAft>
+                <a:spcPts val="1000"/>
+              </a:spcAft>
+              <a:buFont typeface="Arial" panose="020B0604020202020204" pitchFamily="34" charset="0"/>
+              <a:buChar char="•"/>
+              <a:defRPr lang="en-US" sz="1200" kern="1200" smtClean="0">
+                <a:solidFill>
+                  <a:schemeClr val="tx1">
+                    <a:lumMod val="75000"/>
+                    <a:lumOff val="25000"/>
+                  </a:schemeClr>
+                </a:solidFill>
+                <a:latin typeface="+mn-lt"/>
+                <a:ea typeface="+mn-ea"/>
+                <a:cs typeface="+mn-cs"/>
+              </a:defRPr>
+            </a:lvl3pPr>
+            <a:lvl4pPr marL="1600200" indent="-228600" algn="l" defTabSz="914400" rtl="0" eaLnBrk="1" latinLnBrk="0" hangingPunct="1">
+              <a:lnSpc>
+                <a:spcPts val="1800"/>
+              </a:lnSpc>
+              <a:spcBef>
+                <a:spcPts val="1000"/>
+              </a:spcBef>
+              <a:spcAft>
+                <a:spcPts val="1000"/>
+              </a:spcAft>
+              <a:buFont typeface="Arial" panose="020B0604020202020204" pitchFamily="34" charset="0"/>
+              <a:buChar char="•"/>
+              <a:defRPr lang="en-US" sz="1200" kern="1200" smtClean="0">
+                <a:solidFill>
+                  <a:schemeClr val="tx1">
+                    <a:lumMod val="75000"/>
+                    <a:lumOff val="25000"/>
+                  </a:schemeClr>
+                </a:solidFill>
+                <a:latin typeface="+mn-lt"/>
+                <a:ea typeface="+mn-ea"/>
+                <a:cs typeface="+mn-cs"/>
+              </a:defRPr>
+            </a:lvl4pPr>
+            <a:lvl5pPr marL="2057400" indent="-228600" algn="l" defTabSz="914400" rtl="0" eaLnBrk="1" latinLnBrk="0" hangingPunct="1">
+              <a:lnSpc>
+                <a:spcPts val="1800"/>
+              </a:lnSpc>
+              <a:spcBef>
+                <a:spcPts val="1000"/>
+              </a:spcBef>
+              <a:spcAft>
+                <a:spcPts val="1000"/>
+              </a:spcAft>
+              <a:buFont typeface="Arial" panose="020B0604020202020204" pitchFamily="34" charset="0"/>
+              <a:buChar char="•"/>
+              <a:defRPr lang="en-US" sz="1200" kern="1200">
+                <a:solidFill>
+                  <a:schemeClr val="tx1">
+                    <a:lumMod val="75000"/>
+                    <a:lumOff val="25000"/>
+                  </a:schemeClr>
+                </a:solidFill>
+                <a:latin typeface="+mn-lt"/>
+                <a:ea typeface="+mn-ea"/>
+                <a:cs typeface="+mn-cs"/>
+              </a:defRPr>
+            </a:lvl5pPr>
+            <a:lvl6pPr marL="2514600" indent="-228600" algn="l" defTabSz="914400" rtl="0" eaLnBrk="1" latinLnBrk="0" hangingPunct="1">
+              <a:lnSpc>
+                <a:spcPct val="90000"/>
+              </a:lnSpc>
+              <a:spcBef>
+                <a:spcPct val="30000"/>
+              </a:spcBef>
+              <a:buFont typeface="Arial" panose="020B0604020202020204" pitchFamily="34" charset="0"/>
+              <a:buChar char="•"/>
+              <a:defRPr sz="1800" kern="1200">
+                <a:solidFill>
+                  <a:schemeClr val="tx1"/>
+                </a:solidFill>
+                <a:latin typeface="+mn-lt"/>
+                <a:ea typeface="+mn-ea"/>
+                <a:cs typeface="+mn-cs"/>
+              </a:defRPr>
+            </a:lvl6pPr>
+            <a:lvl7pPr marL="2971800" indent="-228600" algn="l" defTabSz="914400" rtl="0" eaLnBrk="1" latinLnBrk="0" hangingPunct="1">
+              <a:lnSpc>
+                <a:spcPct val="90000"/>
+              </a:lnSpc>
+              <a:spcBef>
+                <a:spcPct val="30000"/>
+              </a:spcBef>
+              <a:buFont typeface="Arial" panose="020B0604020202020204" pitchFamily="34" charset="0"/>
+              <a:buChar char="•"/>
+              <a:defRPr sz="1800" kern="1200">
+                <a:solidFill>
+                  <a:schemeClr val="tx1"/>
+                </a:solidFill>
+                <a:latin typeface="+mn-lt"/>
+                <a:ea typeface="+mn-ea"/>
+                <a:cs typeface="+mn-cs"/>
+              </a:defRPr>
+            </a:lvl7pPr>
+            <a:lvl8pPr marL="3429000" indent="-228600" algn="l" defTabSz="914400" rtl="0" eaLnBrk="1" latinLnBrk="0" hangingPunct="1">
+              <a:lnSpc>
+                <a:spcPct val="90000"/>
+              </a:lnSpc>
+              <a:spcBef>
+                <a:spcPct val="30000"/>
+              </a:spcBef>
+              <a:buFont typeface="Arial" panose="020B0604020202020204" pitchFamily="34" charset="0"/>
+              <a:buChar char="•"/>
+              <a:defRPr sz="1800" kern="1200">
+                <a:solidFill>
+                  <a:schemeClr val="tx1"/>
+                </a:solidFill>
+                <a:latin typeface="+mn-lt"/>
+                <a:ea typeface="+mn-ea"/>
+                <a:cs typeface="+mn-cs"/>
+              </a:defRPr>
+            </a:lvl8pPr>
+            <a:lvl9pPr marL="3886200" indent="-228600" algn="l" defTabSz="914400" rtl="0" eaLnBrk="1" latinLnBrk="0" hangingPunct="1">
+              <a:lnSpc>
+                <a:spcPct val="90000"/>
+              </a:lnSpc>
+              <a:spcBef>
+                <a:spcPct val="30000"/>
+              </a:spcBef>
+              <a:buFont typeface="Arial" panose="020B0604020202020204" pitchFamily="34" charset="0"/>
+              <a:buChar char="•"/>
+              <a:defRPr sz="1800" kern="1200">
+                <a:solidFill>
+                  <a:schemeClr val="tx1"/>
+                </a:solidFill>
+                <a:latin typeface="+mn-lt"/>
+                <a:ea typeface="+mn-ea"/>
+                <a:cs typeface="+mn-cs"/>
+              </a:defRPr>
+            </a:lvl9pPr>
+          </a:lstStyle>
+          <a:p>
+            <a:pPr marL="0" lvl="0" indent="0">
+              <a:spcAft>
+                <a:spcPts val="600"/>
+              </a:spcAft>
+              <a:buNone/>
+              <a:defRPr/>
+            </a:pPr>
+            <a:endParaRPr lang="en-US" dirty="0">
+              <a:latin typeface="Segoe UI" panose="020B0502040204020203" pitchFamily="34" charset="0"/>
+              <a:cs typeface="Segoe UI" panose="020B0502040204020203" pitchFamily="34" charset="0"/>
+            </a:endParaRPr>
+          </a:p>
+          <a:p>
+            <a:pPr marL="0" lvl="0" indent="0">
+              <a:spcAft>
+                <a:spcPts val="600"/>
+              </a:spcAft>
+              <a:buNone/>
+              <a:defRPr/>
+            </a:pPr>
+            <a:r>
+              <a:rPr lang="en-US" sz="6400" dirty="0">
+                <a:solidFill>
+                  <a:schemeClr val="accent4"/>
+                </a:solidFill>
+                <a:latin typeface="Segoe UI" panose="020B0502040204020203" pitchFamily="34" charset="0"/>
+                <a:cs typeface="Segoe UI" panose="020B0502040204020203" pitchFamily="34" charset="0"/>
+              </a:rPr>
+              <a:t>Types of Dependency Injection:</a:t>
+            </a:r>
+          </a:p>
+          <a:p>
+            <a:pPr>
+              <a:spcAft>
+                <a:spcPts val="600"/>
+              </a:spcAft>
+              <a:defRPr/>
+            </a:pPr>
+            <a:r>
+              <a:rPr lang="en-IN" sz="6400" b="0" i="0" dirty="0">
+                <a:solidFill>
+                  <a:srgbClr val="4466C5"/>
+                </a:solidFill>
+                <a:effectLst/>
+                <a:latin typeface="Segoe UI" panose="020B0502040204020203" pitchFamily="34" charset="0"/>
+              </a:rPr>
+              <a:t>Constructor Injection</a:t>
+            </a:r>
+          </a:p>
+          <a:p>
+            <a:pPr>
+              <a:spcAft>
+                <a:spcPts val="600"/>
+              </a:spcAft>
+              <a:defRPr/>
+            </a:pPr>
+            <a:r>
+              <a:rPr lang="en-IN" sz="6400" b="0" i="0" dirty="0">
+                <a:solidFill>
+                  <a:srgbClr val="4466C5"/>
+                </a:solidFill>
+                <a:effectLst/>
+                <a:latin typeface="Segoe UI" panose="020B0502040204020203" pitchFamily="34" charset="0"/>
+              </a:rPr>
+              <a:t>Property/Setter Injection</a:t>
+            </a:r>
+          </a:p>
+          <a:p>
+            <a:pPr>
+              <a:spcAft>
+                <a:spcPts val="600"/>
+              </a:spcAft>
+              <a:defRPr/>
+            </a:pPr>
+            <a:r>
+              <a:rPr lang="en-IN" sz="6400" b="0" i="0" dirty="0">
+                <a:solidFill>
+                  <a:srgbClr val="4466C5"/>
+                </a:solidFill>
+                <a:effectLst/>
+                <a:latin typeface="Segoe UI" panose="020B0502040204020203" pitchFamily="34" charset="0"/>
+              </a:rPr>
+              <a:t>Method Injection</a:t>
+            </a:r>
+            <a:endParaRPr lang="en-IN" sz="6400" dirty="0">
+              <a:solidFill>
+                <a:srgbClr val="4466C5"/>
+              </a:solidFill>
+              <a:latin typeface="Segoe UI" panose="020B0502040204020203" pitchFamily="34" charset="0"/>
+            </a:endParaRPr>
+          </a:p>
+          <a:p>
+            <a:pPr marL="0" indent="0">
+              <a:spcAft>
+                <a:spcPts val="600"/>
+              </a:spcAft>
+              <a:buNone/>
+              <a:defRPr/>
+            </a:pPr>
+            <a:r>
+              <a:rPr lang="en-IN" sz="6400" b="0" i="0" dirty="0">
+                <a:solidFill>
+                  <a:schemeClr val="accent4"/>
+                </a:solidFill>
+                <a:effectLst/>
+                <a:latin typeface="Segoe UI" panose="020B0502040204020203" pitchFamily="34" charset="0"/>
+              </a:rPr>
+              <a:t>Benefit:</a:t>
+            </a:r>
+          </a:p>
+          <a:p>
+            <a:pPr>
+              <a:spcAft>
+                <a:spcPts val="600"/>
+              </a:spcAft>
+              <a:defRPr/>
+            </a:pPr>
+            <a:r>
+              <a:rPr lang="en-IN" sz="6400" b="0" i="0" dirty="0">
+                <a:solidFill>
+                  <a:srgbClr val="161616"/>
+                </a:solidFill>
+                <a:effectLst/>
+                <a:latin typeface="Segoe UI" panose="020B0502040204020203" pitchFamily="34" charset="0"/>
+              </a:rPr>
+              <a:t>Reduces class coupling.</a:t>
+            </a:r>
+          </a:p>
+          <a:p>
+            <a:pPr>
+              <a:spcAft>
+                <a:spcPts val="600"/>
+              </a:spcAft>
+              <a:defRPr/>
+            </a:pPr>
+            <a:r>
+              <a:rPr lang="en-IN" sz="6400" b="0" i="0" dirty="0">
+                <a:solidFill>
+                  <a:srgbClr val="161616"/>
+                </a:solidFill>
+                <a:effectLst/>
+                <a:latin typeface="Segoe UI" panose="020B0502040204020203" pitchFamily="34" charset="0"/>
+              </a:rPr>
+              <a:t>Increases code reusability.</a:t>
+            </a:r>
+          </a:p>
+          <a:p>
+            <a:pPr>
+              <a:spcAft>
+                <a:spcPts val="600"/>
+              </a:spcAft>
+              <a:defRPr/>
+            </a:pPr>
+            <a:r>
+              <a:rPr lang="en-IN" sz="6400" b="0" i="0" dirty="0">
+                <a:solidFill>
+                  <a:srgbClr val="161616"/>
+                </a:solidFill>
+                <a:effectLst/>
+                <a:latin typeface="Segoe UI" panose="020B0502040204020203" pitchFamily="34" charset="0"/>
+              </a:rPr>
+              <a:t>Improves code maintainability</a:t>
+            </a:r>
+          </a:p>
+          <a:p>
+            <a:pPr>
+              <a:spcAft>
+                <a:spcPts val="600"/>
+              </a:spcAft>
+              <a:defRPr/>
+            </a:pPr>
+            <a:r>
+              <a:rPr lang="en-IN" sz="6400" b="0" i="0" dirty="0">
+                <a:solidFill>
+                  <a:srgbClr val="161616"/>
+                </a:solidFill>
+                <a:effectLst/>
+                <a:latin typeface="Segoe UI" panose="020B0502040204020203" pitchFamily="34" charset="0"/>
+              </a:rPr>
+              <a:t>Make unit testing possible.</a:t>
+            </a:r>
+          </a:p>
+          <a:p>
+            <a:pPr>
+              <a:spcAft>
+                <a:spcPts val="600"/>
+              </a:spcAft>
+              <a:defRPr/>
+            </a:pPr>
+            <a:endParaRPr lang="en-IN" b="0" i="0" dirty="0">
+              <a:solidFill>
+                <a:srgbClr val="161616"/>
+              </a:solidFill>
+              <a:effectLst/>
+              <a:latin typeface="Segoe UI" panose="020B0502040204020203" pitchFamily="34" charset="0"/>
+            </a:endParaRPr>
+          </a:p>
+          <a:p>
+            <a:pPr marL="0" indent="0">
+              <a:spcAft>
+                <a:spcPts val="600"/>
+              </a:spcAft>
+              <a:buNone/>
+              <a:defRPr/>
+            </a:pPr>
+            <a:endParaRPr lang="en-IN" b="0" i="0" dirty="0">
+              <a:solidFill>
+                <a:schemeClr val="accent4"/>
+              </a:solidFill>
+              <a:effectLst/>
+              <a:latin typeface="Segoe UI" panose="020B0502040204020203" pitchFamily="34" charset="0"/>
+            </a:endParaRPr>
+          </a:p>
+          <a:p>
+            <a:pPr marL="0" indent="0">
+              <a:spcAft>
+                <a:spcPts val="600"/>
+              </a:spcAft>
+              <a:buNone/>
+              <a:defRPr/>
+            </a:pPr>
+            <a:endParaRPr lang="en-US" b="1" dirty="0">
+              <a:solidFill>
+                <a:schemeClr val="tx1"/>
+              </a:solidFill>
+              <a:latin typeface="Segoe UI" panose="020B0502040204020203" pitchFamily="34" charset="0"/>
+              <a:cs typeface="Segoe UI" panose="020B0502040204020203" pitchFamily="34" charset="0"/>
+            </a:endParaRPr>
+          </a:p>
+          <a:p>
+            <a:pPr marL="0" indent="0">
+              <a:spcAft>
+                <a:spcPts val="600"/>
+              </a:spcAft>
+              <a:buNone/>
+              <a:defRPr/>
+            </a:pPr>
+            <a:r>
+              <a:rPr lang="en-US" b="1" dirty="0">
+                <a:latin typeface="Segoe UI" panose="020B0502040204020203" pitchFamily="34" charset="0"/>
+                <a:cs typeface="Segoe UI" panose="020B0502040204020203" pitchFamily="34" charset="0"/>
+              </a:rPr>
+              <a:t> </a:t>
+            </a:r>
+            <a:endParaRPr lang="en-US" dirty="0">
+              <a:latin typeface="Segoe UI" panose="020B0502040204020203" pitchFamily="34" charset="0"/>
+              <a:cs typeface="Segoe UI" panose="020B0502040204020203" pitchFamily="34" charset="0"/>
+            </a:endParaRPr>
+          </a:p>
+        </p:txBody>
+      </p:sp>
+      <p:pic>
+        <p:nvPicPr>
+          <p:cNvPr id="3" name="Picture 2">
+            <a:extLst>
+              <a:ext uri="{FF2B5EF4-FFF2-40B4-BE49-F238E27FC236}">
+                <a16:creationId xmlns:a16="http://schemas.microsoft.com/office/drawing/2014/main" id="{A77479DA-A4C8-9392-41C4-6F825CFFD9B1}"/>
+              </a:ext>
+            </a:extLst>
+          </p:cNvPr>
+          <p:cNvPicPr>
+            <a:picLocks noChangeAspect="1"/>
+          </p:cNvPicPr>
+          <p:nvPr/>
+        </p:nvPicPr>
+        <p:blipFill>
+          <a:blip r:embed="rId2"/>
+          <a:stretch>
+            <a:fillRect/>
+          </a:stretch>
+        </p:blipFill>
+        <p:spPr>
+          <a:xfrm>
+            <a:off x="5607698" y="1285569"/>
+            <a:ext cx="5918561" cy="2699575"/>
+          </a:xfrm>
+          <a:prstGeom prst="rect">
+            <a:avLst/>
+          </a:prstGeom>
+        </p:spPr>
+      </p:pic>
+      <p:pic>
+        <p:nvPicPr>
+          <p:cNvPr id="5" name="Picture 4">
+            <a:extLst>
+              <a:ext uri="{FF2B5EF4-FFF2-40B4-BE49-F238E27FC236}">
+                <a16:creationId xmlns:a16="http://schemas.microsoft.com/office/drawing/2014/main" id="{827108ED-89EE-BBF9-75DD-E206D59FCEDF}"/>
+              </a:ext>
+            </a:extLst>
+          </p:cNvPr>
+          <p:cNvPicPr>
+            <a:picLocks noChangeAspect="1"/>
+          </p:cNvPicPr>
+          <p:nvPr/>
+        </p:nvPicPr>
+        <p:blipFill>
+          <a:blip r:embed="rId3"/>
+          <a:stretch>
+            <a:fillRect/>
+          </a:stretch>
+        </p:blipFill>
+        <p:spPr>
+          <a:xfrm>
+            <a:off x="5309118" y="4019049"/>
+            <a:ext cx="6361677" cy="2390895"/>
+          </a:xfrm>
+          <a:prstGeom prst="rect">
+            <a:avLst/>
+          </a:prstGeom>
+        </p:spPr>
+      </p:pic>
+    </p:spTree>
+    <p:extLst>
+      <p:ext uri="{BB962C8B-B14F-4D97-AF65-F5344CB8AC3E}">
+        <p14:creationId xmlns:p14="http://schemas.microsoft.com/office/powerpoint/2010/main" val="2609524556"/>
+      </p:ext>
+    </p:extLst>
+  </p:cSld>
+  <p:clrMapOvr>
+    <a:masterClrMapping/>
+  </p:clrMapOvr>
+  <mc:AlternateContent xmlns:mc="http://schemas.openxmlformats.org/markup-compatibility/2006" xmlns:p14="http://schemas.microsoft.com/office/powerpoint/2010/main">
+    <mc:Choice Requires="p14">
+      <p:transition p14:dur="10"/>
+    </mc:Choice>
+    <mc:Fallback xmlns="">
+      <p:transition/>
+    </mc:Fallback>
+  </mc:AlternateContent>
+</p:sld>
+</file>
+
+<file path=ppt/slides/slide9.xml><?xml version="1.0" encoding="utf-8"?>
 <p:sld xmlns:a="http://schemas.openxmlformats.org/drawingml/2006/main" xmlns:r="http://schemas.openxmlformats.org/officeDocument/2006/relationships" xmlns:p="http://schemas.openxmlformats.org/presentationml/2006/main">
   <p:cSld>
     <p:spTree>
@@ -7262,8 +8304,8 @@
         </p:nvSpPr>
         <p:spPr>
           <a:xfrm rot="21077122">
-            <a:off x="842553" y="1768521"/>
-            <a:ext cx="3458269" cy="435610"/>
+            <a:off x="719447" y="1513628"/>
+            <a:ext cx="3458269" cy="1075310"/>
           </a:xfrm>
           <a:prstGeom prst="rect">
             <a:avLst/>
@@ -7308,10 +8350,23 @@
                 <a:ea typeface="SimHei" panose="02010609060101010101" pitchFamily="49" charset="-122"/>
                 <a:cs typeface="Times New Roman" panose="02020603050405020304" pitchFamily="18" charset="0"/>
               </a:rPr>
-              <a:t>Ye ab </a:t>
-            </a:r>
-            <a:r>
-              <a:rPr lang="en-US" sz="2000" b="1" kern="1000" spc="100" dirty="0" err="1">
+              <a:t>I also inject colleague who </a:t>
+            </a:r>
+          </a:p>
+          <a:p>
+            <a:pPr marL="0" marR="0" algn="ctr">
+              <a:spcBef>
+                <a:spcPts val="0"/>
+              </a:spcBef>
+              <a:spcAft>
+                <a:spcPts val="200"/>
+              </a:spcAft>
+              <a:tabLst>
+                <a:tab pos="4931410" algn="l"/>
+              </a:tabLst>
+            </a:pPr>
+            <a:r>
+              <a:rPr lang="en-US" sz="2000" b="1" kern="1000" spc="100" dirty="0">
                 <a:solidFill>
                   <a:srgbClr val="D24726"/>
                 </a:solidFill>
@@ -7319,396 +8374,17 @@
                 <a:ea typeface="SimHei" panose="02010609060101010101" pitchFamily="49" charset="-122"/>
                 <a:cs typeface="Times New Roman" panose="02020603050405020304" pitchFamily="18" charset="0"/>
               </a:rPr>
-              <a:t>bakwas</a:t>
-            </a:r>
-            <a:r>
-              <a:rPr lang="en-US" sz="2000" b="1" kern="1000" spc="100" dirty="0">
-                <a:solidFill>
-                  <a:srgbClr val="D24726"/>
-                </a:solidFill>
-                <a:latin typeface="Segoe UI Semibold" panose="020B0702040204020203" pitchFamily="34" charset="0"/>
-                <a:ea typeface="SimHei" panose="02010609060101010101" pitchFamily="49" charset="-122"/>
-                <a:cs typeface="Times New Roman" panose="02020603050405020304" pitchFamily="18" charset="0"/>
-              </a:rPr>
-              <a:t> </a:t>
-            </a:r>
-            <a:r>
-              <a:rPr lang="en-US" sz="2000" b="1" kern="1000" spc="100" dirty="0" err="1">
-                <a:solidFill>
-                  <a:srgbClr val="D24726"/>
-                </a:solidFill>
-                <a:latin typeface="Segoe UI Semibold" panose="020B0702040204020203" pitchFamily="34" charset="0"/>
-                <a:ea typeface="SimHei" panose="02010609060101010101" pitchFamily="49" charset="-122"/>
-                <a:cs typeface="Times New Roman" panose="02020603050405020304" pitchFamily="18" charset="0"/>
-              </a:rPr>
-              <a:t>chalu</a:t>
-            </a:r>
-            <a:r>
-              <a:rPr lang="en-US" sz="2000" b="1" kern="1000" spc="100" dirty="0">
-                <a:solidFill>
-                  <a:srgbClr val="D24726"/>
-                </a:solidFill>
-                <a:latin typeface="Segoe UI Semibold" panose="020B0702040204020203" pitchFamily="34" charset="0"/>
-                <a:ea typeface="SimHei" panose="02010609060101010101" pitchFamily="49" charset="-122"/>
-                <a:cs typeface="Times New Roman" panose="02020603050405020304" pitchFamily="18" charset="0"/>
-              </a:rPr>
-              <a:t> </a:t>
-            </a:r>
-            <a:r>
-              <a:rPr lang="en-US" sz="2000" b="1" kern="1000" spc="100" dirty="0" err="1">
-                <a:solidFill>
-                  <a:srgbClr val="D24726"/>
-                </a:solidFill>
-                <a:latin typeface="Segoe UI Semibold" panose="020B0702040204020203" pitchFamily="34" charset="0"/>
-                <a:ea typeface="SimHei" panose="02010609060101010101" pitchFamily="49" charset="-122"/>
-                <a:cs typeface="Times New Roman" panose="02020603050405020304" pitchFamily="18" charset="0"/>
-              </a:rPr>
-              <a:t>karega</a:t>
-            </a:r>
-            <a:endParaRPr lang="en-US" sz="2000" b="1" kern="1400" dirty="0">
-              <a:solidFill>
-                <a:srgbClr val="D24726"/>
-              </a:solidFill>
-              <a:effectLst/>
-              <a:latin typeface="Segoe UI Light" panose="020B0502040204020203" pitchFamily="34" charset="0"/>
-              <a:ea typeface="SimHei" panose="02010609060101010101" pitchFamily="49" charset="-122"/>
-              <a:cs typeface="Times New Roman" panose="02020603050405020304" pitchFamily="18" charset="0"/>
-            </a:endParaRPr>
-          </a:p>
-        </p:txBody>
-      </p:sp>
-    </p:spTree>
-    <p:extLst>
-      <p:ext uri="{BB962C8B-B14F-4D97-AF65-F5344CB8AC3E}">
-        <p14:creationId xmlns:p14="http://schemas.microsoft.com/office/powerpoint/2010/main" val="3662858974"/>
-      </p:ext>
-    </p:extLst>
-  </p:cSld>
-  <p:clrMapOvr>
-    <a:masterClrMapping/>
-  </p:clrMapOvr>
-  <mc:AlternateContent xmlns:mc="http://schemas.openxmlformats.org/markup-compatibility/2006" xmlns:p14="http://schemas.microsoft.com/office/powerpoint/2010/main">
-    <mc:Choice Requires="p14">
-      <p:transition p14:dur="10"/>
-    </mc:Choice>
-    <mc:Fallback xmlns="">
-      <p:transition/>
-    </mc:Fallback>
-  </mc:AlternateContent>
-</p:sld>
-</file>
-
-<file path=ppt/slides/slide8.xml><?xml version="1.0" encoding="utf-8"?>
-<p:sld xmlns:a="http://schemas.openxmlformats.org/drawingml/2006/main" xmlns:r="http://schemas.openxmlformats.org/officeDocument/2006/relationships" xmlns:p="http://schemas.openxmlformats.org/presentationml/2006/main">
-  <p:cSld>
-    <p:spTree>
-      <p:nvGrpSpPr>
-        <p:cNvPr id="1" name=""/>
-        <p:cNvGrpSpPr/>
-        <p:nvPr/>
-      </p:nvGrpSpPr>
-      <p:grpSpPr>
-        <a:xfrm>
-          <a:off x="0" y="0"/>
-          <a:ext cx="0" cy="0"/>
-          <a:chOff x="0" y="0"/>
-          <a:chExt cx="0" cy="0"/>
-        </a:xfrm>
-      </p:grpSpPr>
-      <p:sp>
-        <p:nvSpPr>
-          <p:cNvPr id="8" name="Title 7"/>
-          <p:cNvSpPr>
-            <a:spLocks noGrp="1"/>
-          </p:cNvSpPr>
-          <p:nvPr>
-            <p:ph type="title"/>
-          </p:nvPr>
-        </p:nvSpPr>
-        <p:spPr>
-          <a:xfrm>
-            <a:off x="521207" y="448056"/>
-            <a:ext cx="7658059" cy="640080"/>
-          </a:xfrm>
-        </p:spPr>
-        <p:txBody>
-          <a:bodyPr>
-            <a:noAutofit/>
-          </a:bodyPr>
-          <a:lstStyle/>
-          <a:p>
-            <a:r>
-              <a:rPr lang="en-US" dirty="0">
-                <a:latin typeface="Segoe UI Light" panose="020B0502040204020203" pitchFamily="34" charset="0"/>
-                <a:cs typeface="Segoe UI Light" panose="020B0502040204020203" pitchFamily="34" charset="0"/>
-              </a:rPr>
-              <a:t>INVERSION OF CONTROL(IoC) Principle</a:t>
-            </a:r>
-          </a:p>
-        </p:txBody>
-      </p:sp>
-      <p:sp>
-        <p:nvSpPr>
-          <p:cNvPr id="38" name="Content Placeholder 17"/>
-          <p:cNvSpPr txBox="1">
-            <a:spLocks/>
-          </p:cNvSpPr>
-          <p:nvPr/>
-        </p:nvSpPr>
-        <p:spPr>
-          <a:xfrm>
-            <a:off x="521205" y="1285570"/>
-            <a:ext cx="5032307" cy="5186486"/>
-          </a:xfrm>
-          <a:prstGeom prst="rect">
-            <a:avLst/>
-          </a:prstGeom>
-        </p:spPr>
-        <p:txBody>
-          <a:bodyPr vert="horz" lIns="91440" tIns="45720" rIns="91440" bIns="45720" rtlCol="0">
-            <a:normAutofit/>
-          </a:bodyPr>
-          <a:lstStyle>
-            <a:lvl1pPr marL="228600" indent="-228600" algn="l" defTabSz="914400" rtl="0" eaLnBrk="1" latinLnBrk="0" hangingPunct="1">
-              <a:lnSpc>
-                <a:spcPts val="1800"/>
-              </a:lnSpc>
-              <a:spcBef>
-                <a:spcPts val="1000"/>
-              </a:spcBef>
-              <a:spcAft>
-                <a:spcPts val="1000"/>
-              </a:spcAft>
-              <a:buFont typeface="Arial" panose="020B0604020202020204" pitchFamily="34" charset="0"/>
-              <a:buChar char="•"/>
-              <a:defRPr lang="en-US" sz="1200" kern="1200" smtClean="0">
-                <a:solidFill>
-                  <a:schemeClr val="tx1">
-                    <a:lumMod val="75000"/>
-                    <a:lumOff val="25000"/>
-                  </a:schemeClr>
-                </a:solidFill>
-                <a:latin typeface="+mn-lt"/>
-                <a:ea typeface="+mn-ea"/>
-                <a:cs typeface="+mn-cs"/>
-              </a:defRPr>
-            </a:lvl1pPr>
-            <a:lvl2pPr marL="685800" indent="-228600" algn="l" defTabSz="914400" rtl="0" eaLnBrk="1" latinLnBrk="0" hangingPunct="1">
-              <a:lnSpc>
-                <a:spcPts val="1800"/>
-              </a:lnSpc>
-              <a:spcBef>
-                <a:spcPts val="1000"/>
-              </a:spcBef>
-              <a:spcAft>
-                <a:spcPts val="1000"/>
-              </a:spcAft>
-              <a:buFont typeface="Arial" panose="020B0604020202020204" pitchFamily="34" charset="0"/>
-              <a:buChar char="•"/>
-              <a:defRPr lang="en-US" sz="1200" kern="1200" smtClean="0">
-                <a:solidFill>
-                  <a:schemeClr val="tx1">
-                    <a:lumMod val="75000"/>
-                    <a:lumOff val="25000"/>
-                  </a:schemeClr>
-                </a:solidFill>
-                <a:latin typeface="+mn-lt"/>
-                <a:ea typeface="+mn-ea"/>
-                <a:cs typeface="+mn-cs"/>
-              </a:defRPr>
-            </a:lvl2pPr>
-            <a:lvl3pPr marL="1143000" indent="-228600" algn="l" defTabSz="914400" rtl="0" eaLnBrk="1" latinLnBrk="0" hangingPunct="1">
-              <a:lnSpc>
-                <a:spcPts val="1800"/>
-              </a:lnSpc>
-              <a:spcBef>
-                <a:spcPts val="1000"/>
-              </a:spcBef>
-              <a:spcAft>
-                <a:spcPts val="1000"/>
-              </a:spcAft>
-              <a:buFont typeface="Arial" panose="020B0604020202020204" pitchFamily="34" charset="0"/>
-              <a:buChar char="•"/>
-              <a:defRPr lang="en-US" sz="1200" kern="1200" smtClean="0">
-                <a:solidFill>
-                  <a:schemeClr val="tx1">
-                    <a:lumMod val="75000"/>
-                    <a:lumOff val="25000"/>
-                  </a:schemeClr>
-                </a:solidFill>
-                <a:latin typeface="+mn-lt"/>
-                <a:ea typeface="+mn-ea"/>
-                <a:cs typeface="+mn-cs"/>
-              </a:defRPr>
-            </a:lvl3pPr>
-            <a:lvl4pPr marL="1600200" indent="-228600" algn="l" defTabSz="914400" rtl="0" eaLnBrk="1" latinLnBrk="0" hangingPunct="1">
-              <a:lnSpc>
-                <a:spcPts val="1800"/>
-              </a:lnSpc>
-              <a:spcBef>
-                <a:spcPts val="1000"/>
-              </a:spcBef>
-              <a:spcAft>
-                <a:spcPts val="1000"/>
-              </a:spcAft>
-              <a:buFont typeface="Arial" panose="020B0604020202020204" pitchFamily="34" charset="0"/>
-              <a:buChar char="•"/>
-              <a:defRPr lang="en-US" sz="1200" kern="1200" smtClean="0">
-                <a:solidFill>
-                  <a:schemeClr val="tx1">
-                    <a:lumMod val="75000"/>
-                    <a:lumOff val="25000"/>
-                  </a:schemeClr>
-                </a:solidFill>
-                <a:latin typeface="+mn-lt"/>
-                <a:ea typeface="+mn-ea"/>
-                <a:cs typeface="+mn-cs"/>
-              </a:defRPr>
-            </a:lvl4pPr>
-            <a:lvl5pPr marL="2057400" indent="-228600" algn="l" defTabSz="914400" rtl="0" eaLnBrk="1" latinLnBrk="0" hangingPunct="1">
-              <a:lnSpc>
-                <a:spcPts val="1800"/>
-              </a:lnSpc>
-              <a:spcBef>
-                <a:spcPts val="1000"/>
-              </a:spcBef>
-              <a:spcAft>
-                <a:spcPts val="1000"/>
-              </a:spcAft>
-              <a:buFont typeface="Arial" panose="020B0604020202020204" pitchFamily="34" charset="0"/>
-              <a:buChar char="•"/>
-              <a:defRPr lang="en-US" sz="1200" kern="1200">
-                <a:solidFill>
-                  <a:schemeClr val="tx1">
-                    <a:lumMod val="75000"/>
-                    <a:lumOff val="25000"/>
-                  </a:schemeClr>
-                </a:solidFill>
-                <a:latin typeface="+mn-lt"/>
-                <a:ea typeface="+mn-ea"/>
-                <a:cs typeface="+mn-cs"/>
-              </a:defRPr>
-            </a:lvl5pPr>
-            <a:lvl6pPr marL="2514600" indent="-228600" algn="l" defTabSz="914400" rtl="0" eaLnBrk="1" latinLnBrk="0" hangingPunct="1">
-              <a:lnSpc>
-                <a:spcPct val="90000"/>
-              </a:lnSpc>
-              <a:spcBef>
-                <a:spcPct val="30000"/>
-              </a:spcBef>
-              <a:buFont typeface="Arial" panose="020B0604020202020204" pitchFamily="34" charset="0"/>
-              <a:buChar char="•"/>
-              <a:defRPr sz="1800" kern="1200">
-                <a:solidFill>
-                  <a:schemeClr val="tx1"/>
-                </a:solidFill>
-                <a:latin typeface="+mn-lt"/>
-                <a:ea typeface="+mn-ea"/>
-                <a:cs typeface="+mn-cs"/>
-              </a:defRPr>
-            </a:lvl6pPr>
-            <a:lvl7pPr marL="2971800" indent="-228600" algn="l" defTabSz="914400" rtl="0" eaLnBrk="1" latinLnBrk="0" hangingPunct="1">
-              <a:lnSpc>
-                <a:spcPct val="90000"/>
-              </a:lnSpc>
-              <a:spcBef>
-                <a:spcPct val="30000"/>
-              </a:spcBef>
-              <a:buFont typeface="Arial" panose="020B0604020202020204" pitchFamily="34" charset="0"/>
-              <a:buChar char="•"/>
-              <a:defRPr sz="1800" kern="1200">
-                <a:solidFill>
-                  <a:schemeClr val="tx1"/>
-                </a:solidFill>
-                <a:latin typeface="+mn-lt"/>
-                <a:ea typeface="+mn-ea"/>
-                <a:cs typeface="+mn-cs"/>
-              </a:defRPr>
-            </a:lvl7pPr>
-            <a:lvl8pPr marL="3429000" indent="-228600" algn="l" defTabSz="914400" rtl="0" eaLnBrk="1" latinLnBrk="0" hangingPunct="1">
-              <a:lnSpc>
-                <a:spcPct val="90000"/>
-              </a:lnSpc>
-              <a:spcBef>
-                <a:spcPct val="30000"/>
-              </a:spcBef>
-              <a:buFont typeface="Arial" panose="020B0604020202020204" pitchFamily="34" charset="0"/>
-              <a:buChar char="•"/>
-              <a:defRPr sz="1800" kern="1200">
-                <a:solidFill>
-                  <a:schemeClr val="tx1"/>
-                </a:solidFill>
-                <a:latin typeface="+mn-lt"/>
-                <a:ea typeface="+mn-ea"/>
-                <a:cs typeface="+mn-cs"/>
-              </a:defRPr>
-            </a:lvl8pPr>
-            <a:lvl9pPr marL="3886200" indent="-228600" algn="l" defTabSz="914400" rtl="0" eaLnBrk="1" latinLnBrk="0" hangingPunct="1">
-              <a:lnSpc>
-                <a:spcPct val="90000"/>
-              </a:lnSpc>
-              <a:spcBef>
-                <a:spcPct val="30000"/>
-              </a:spcBef>
-              <a:buFont typeface="Arial" panose="020B0604020202020204" pitchFamily="34" charset="0"/>
-              <a:buChar char="•"/>
-              <a:defRPr sz="1800" kern="1200">
-                <a:solidFill>
-                  <a:schemeClr val="tx1"/>
-                </a:solidFill>
-                <a:latin typeface="+mn-lt"/>
-                <a:ea typeface="+mn-ea"/>
-                <a:cs typeface="+mn-cs"/>
-              </a:defRPr>
-            </a:lvl9pPr>
-          </a:lstStyle>
-          <a:p>
-            <a:pPr marL="0" lvl="0" indent="0">
-              <a:spcAft>
-                <a:spcPts val="600"/>
-              </a:spcAft>
-              <a:buNone/>
-              <a:defRPr/>
-            </a:pPr>
-            <a:endParaRPr lang="en-US" sz="1100" dirty="0">
-              <a:latin typeface="Segoe UI" panose="020B0502040204020203" pitchFamily="34" charset="0"/>
-              <a:cs typeface="Segoe UI" panose="020B0502040204020203" pitchFamily="34" charset="0"/>
-            </a:endParaRPr>
-          </a:p>
-          <a:p>
-            <a:pPr marL="0" lvl="0" indent="0">
-              <a:spcAft>
-                <a:spcPts val="600"/>
-              </a:spcAft>
-              <a:buNone/>
-              <a:defRPr/>
-            </a:pPr>
-            <a:endParaRPr lang="en-US" sz="1100" dirty="0">
-              <a:latin typeface="Segoe UI" panose="020B0502040204020203" pitchFamily="34" charset="0"/>
-              <a:cs typeface="Segoe UI" panose="020B0502040204020203" pitchFamily="34" charset="0"/>
-            </a:endParaRPr>
-          </a:p>
-          <a:p>
-            <a:pPr marL="0" lvl="0" indent="0">
-              <a:spcAft>
-                <a:spcPts val="600"/>
-              </a:spcAft>
-              <a:buNone/>
-              <a:defRPr/>
-            </a:pPr>
-            <a:endParaRPr lang="en-US" sz="1100" dirty="0">
-              <a:latin typeface="Segoe UI" panose="020B0502040204020203" pitchFamily="34" charset="0"/>
-              <a:cs typeface="Segoe UI" panose="020B0502040204020203" pitchFamily="34" charset="0"/>
-            </a:endParaRPr>
+              <a:t>do my work </a:t>
+            </a:r>
           </a:p>
         </p:txBody>
       </p:sp>
       <p:pic>
         <p:nvPicPr>
-          <p:cNvPr id="1026" name="Picture 2" descr="Difference between Design Principle and Design Pattern and IoC Containers in C#">
+          <p:cNvPr id="4098" name="Picture 2" descr="Image result for smile emoji">
             <a:extLst>
               <a:ext uri="{FF2B5EF4-FFF2-40B4-BE49-F238E27FC236}">
-                <a16:creationId xmlns:a16="http://schemas.microsoft.com/office/drawing/2014/main" id="{1D8CA53E-A75E-E5A8-F74C-DFE5165644FA}"/>
+                <a16:creationId xmlns:a16="http://schemas.microsoft.com/office/drawing/2014/main" id="{F6DC26A0-56E1-AAEF-E0CD-9751EA181FD4}"/>
               </a:ext>
             </a:extLst>
           </p:cNvPr>
@@ -7718,7 +8394,7 @@
           <p:nvPr/>
         </p:nvPicPr>
         <p:blipFill>
-          <a:blip r:embed="rId2">
+          <a:blip r:embed="rId4">
             <a:extLst>
               <a:ext uri="{28A0092B-C50C-407E-A947-70E740481C1C}">
                 <a14:useLocalDpi xmlns:a14="http://schemas.microsoft.com/office/drawing/2010/main" val="0"/>
@@ -7732,8 +8408,8 @@
         </p:blipFill>
         <p:spPr bwMode="auto">
           <a:xfrm>
-            <a:off x="6226629" y="1757362"/>
-            <a:ext cx="5524064" cy="3343275"/>
+            <a:off x="2104345" y="2349878"/>
+            <a:ext cx="989681" cy="989681"/>
           </a:xfrm>
           <a:prstGeom prst="rect">
             <a:avLst/>
@@ -7750,915 +8426,10 @@
           </a:extLst>
         </p:spPr>
       </p:pic>
-      <p:sp>
-        <p:nvSpPr>
-          <p:cNvPr id="7" name="Content Placeholder 17">
-            <a:extLst>
-              <a:ext uri="{FF2B5EF4-FFF2-40B4-BE49-F238E27FC236}">
-                <a16:creationId xmlns:a16="http://schemas.microsoft.com/office/drawing/2014/main" id="{6FD3624F-2716-0033-3E3E-5086D8BE7DFC}"/>
-              </a:ext>
-            </a:extLst>
-          </p:cNvPr>
-          <p:cNvSpPr txBox="1">
-            <a:spLocks/>
-          </p:cNvSpPr>
-          <p:nvPr/>
-        </p:nvSpPr>
-        <p:spPr>
-          <a:xfrm>
-            <a:off x="651835" y="1143644"/>
-            <a:ext cx="5444166" cy="5470337"/>
-          </a:xfrm>
-          <a:prstGeom prst="rect">
-            <a:avLst/>
-          </a:prstGeom>
-        </p:spPr>
-        <p:txBody>
-          <a:bodyPr vert="horz" lIns="91440" tIns="45720" rIns="91440" bIns="45720" rtlCol="0">
-            <a:normAutofit/>
-          </a:bodyPr>
-          <a:lstStyle>
-            <a:lvl1pPr marL="228600" indent="-228600" algn="l" defTabSz="914400" rtl="0" eaLnBrk="1" latinLnBrk="0" hangingPunct="1">
-              <a:lnSpc>
-                <a:spcPts val="1800"/>
-              </a:lnSpc>
-              <a:spcBef>
-                <a:spcPts val="1000"/>
-              </a:spcBef>
-              <a:spcAft>
-                <a:spcPts val="1000"/>
-              </a:spcAft>
-              <a:buFont typeface="Arial" panose="020B0604020202020204" pitchFamily="34" charset="0"/>
-              <a:buChar char="•"/>
-              <a:defRPr lang="en-US" sz="1200" kern="1200" smtClean="0">
-                <a:solidFill>
-                  <a:schemeClr val="tx1">
-                    <a:lumMod val="75000"/>
-                    <a:lumOff val="25000"/>
-                  </a:schemeClr>
-                </a:solidFill>
-                <a:latin typeface="+mn-lt"/>
-                <a:ea typeface="+mn-ea"/>
-                <a:cs typeface="+mn-cs"/>
-              </a:defRPr>
-            </a:lvl1pPr>
-            <a:lvl2pPr marL="685800" indent="-228600" algn="l" defTabSz="914400" rtl="0" eaLnBrk="1" latinLnBrk="0" hangingPunct="1">
-              <a:lnSpc>
-                <a:spcPts val="1800"/>
-              </a:lnSpc>
-              <a:spcBef>
-                <a:spcPts val="1000"/>
-              </a:spcBef>
-              <a:spcAft>
-                <a:spcPts val="1000"/>
-              </a:spcAft>
-              <a:buFont typeface="Arial" panose="020B0604020202020204" pitchFamily="34" charset="0"/>
-              <a:buChar char="•"/>
-              <a:defRPr lang="en-US" sz="1200" kern="1200" smtClean="0">
-                <a:solidFill>
-                  <a:schemeClr val="tx1">
-                    <a:lumMod val="75000"/>
-                    <a:lumOff val="25000"/>
-                  </a:schemeClr>
-                </a:solidFill>
-                <a:latin typeface="+mn-lt"/>
-                <a:ea typeface="+mn-ea"/>
-                <a:cs typeface="+mn-cs"/>
-              </a:defRPr>
-            </a:lvl2pPr>
-            <a:lvl3pPr marL="1143000" indent="-228600" algn="l" defTabSz="914400" rtl="0" eaLnBrk="1" latinLnBrk="0" hangingPunct="1">
-              <a:lnSpc>
-                <a:spcPts val="1800"/>
-              </a:lnSpc>
-              <a:spcBef>
-                <a:spcPts val="1000"/>
-              </a:spcBef>
-              <a:spcAft>
-                <a:spcPts val="1000"/>
-              </a:spcAft>
-              <a:buFont typeface="Arial" panose="020B0604020202020204" pitchFamily="34" charset="0"/>
-              <a:buChar char="•"/>
-              <a:defRPr lang="en-US" sz="1200" kern="1200" smtClean="0">
-                <a:solidFill>
-                  <a:schemeClr val="tx1">
-                    <a:lumMod val="75000"/>
-                    <a:lumOff val="25000"/>
-                  </a:schemeClr>
-                </a:solidFill>
-                <a:latin typeface="+mn-lt"/>
-                <a:ea typeface="+mn-ea"/>
-                <a:cs typeface="+mn-cs"/>
-              </a:defRPr>
-            </a:lvl3pPr>
-            <a:lvl4pPr marL="1600200" indent="-228600" algn="l" defTabSz="914400" rtl="0" eaLnBrk="1" latinLnBrk="0" hangingPunct="1">
-              <a:lnSpc>
-                <a:spcPts val="1800"/>
-              </a:lnSpc>
-              <a:spcBef>
-                <a:spcPts val="1000"/>
-              </a:spcBef>
-              <a:spcAft>
-                <a:spcPts val="1000"/>
-              </a:spcAft>
-              <a:buFont typeface="Arial" panose="020B0604020202020204" pitchFamily="34" charset="0"/>
-              <a:buChar char="•"/>
-              <a:defRPr lang="en-US" sz="1200" kern="1200" smtClean="0">
-                <a:solidFill>
-                  <a:schemeClr val="tx1">
-                    <a:lumMod val="75000"/>
-                    <a:lumOff val="25000"/>
-                  </a:schemeClr>
-                </a:solidFill>
-                <a:latin typeface="+mn-lt"/>
-                <a:ea typeface="+mn-ea"/>
-                <a:cs typeface="+mn-cs"/>
-              </a:defRPr>
-            </a:lvl4pPr>
-            <a:lvl5pPr marL="2057400" indent="-228600" algn="l" defTabSz="914400" rtl="0" eaLnBrk="1" latinLnBrk="0" hangingPunct="1">
-              <a:lnSpc>
-                <a:spcPts val="1800"/>
-              </a:lnSpc>
-              <a:spcBef>
-                <a:spcPts val="1000"/>
-              </a:spcBef>
-              <a:spcAft>
-                <a:spcPts val="1000"/>
-              </a:spcAft>
-              <a:buFont typeface="Arial" panose="020B0604020202020204" pitchFamily="34" charset="0"/>
-              <a:buChar char="•"/>
-              <a:defRPr lang="en-US" sz="1200" kern="1200">
-                <a:solidFill>
-                  <a:schemeClr val="tx1">
-                    <a:lumMod val="75000"/>
-                    <a:lumOff val="25000"/>
-                  </a:schemeClr>
-                </a:solidFill>
-                <a:latin typeface="+mn-lt"/>
-                <a:ea typeface="+mn-ea"/>
-                <a:cs typeface="+mn-cs"/>
-              </a:defRPr>
-            </a:lvl5pPr>
-            <a:lvl6pPr marL="2514600" indent="-228600" algn="l" defTabSz="914400" rtl="0" eaLnBrk="1" latinLnBrk="0" hangingPunct="1">
-              <a:lnSpc>
-                <a:spcPct val="90000"/>
-              </a:lnSpc>
-              <a:spcBef>
-                <a:spcPct val="30000"/>
-              </a:spcBef>
-              <a:buFont typeface="Arial" panose="020B0604020202020204" pitchFamily="34" charset="0"/>
-              <a:buChar char="•"/>
-              <a:defRPr sz="1800" kern="1200">
-                <a:solidFill>
-                  <a:schemeClr val="tx1"/>
-                </a:solidFill>
-                <a:latin typeface="+mn-lt"/>
-                <a:ea typeface="+mn-ea"/>
-                <a:cs typeface="+mn-cs"/>
-              </a:defRPr>
-            </a:lvl6pPr>
-            <a:lvl7pPr marL="2971800" indent="-228600" algn="l" defTabSz="914400" rtl="0" eaLnBrk="1" latinLnBrk="0" hangingPunct="1">
-              <a:lnSpc>
-                <a:spcPct val="90000"/>
-              </a:lnSpc>
-              <a:spcBef>
-                <a:spcPct val="30000"/>
-              </a:spcBef>
-              <a:buFont typeface="Arial" panose="020B0604020202020204" pitchFamily="34" charset="0"/>
-              <a:buChar char="•"/>
-              <a:defRPr sz="1800" kern="1200">
-                <a:solidFill>
-                  <a:schemeClr val="tx1"/>
-                </a:solidFill>
-                <a:latin typeface="+mn-lt"/>
-                <a:ea typeface="+mn-ea"/>
-                <a:cs typeface="+mn-cs"/>
-              </a:defRPr>
-            </a:lvl7pPr>
-            <a:lvl8pPr marL="3429000" indent="-228600" algn="l" defTabSz="914400" rtl="0" eaLnBrk="1" latinLnBrk="0" hangingPunct="1">
-              <a:lnSpc>
-                <a:spcPct val="90000"/>
-              </a:lnSpc>
-              <a:spcBef>
-                <a:spcPct val="30000"/>
-              </a:spcBef>
-              <a:buFont typeface="Arial" panose="020B0604020202020204" pitchFamily="34" charset="0"/>
-              <a:buChar char="•"/>
-              <a:defRPr sz="1800" kern="1200">
-                <a:solidFill>
-                  <a:schemeClr val="tx1"/>
-                </a:solidFill>
-                <a:latin typeface="+mn-lt"/>
-                <a:ea typeface="+mn-ea"/>
-                <a:cs typeface="+mn-cs"/>
-              </a:defRPr>
-            </a:lvl8pPr>
-            <a:lvl9pPr marL="3886200" indent="-228600" algn="l" defTabSz="914400" rtl="0" eaLnBrk="1" latinLnBrk="0" hangingPunct="1">
-              <a:lnSpc>
-                <a:spcPct val="90000"/>
-              </a:lnSpc>
-              <a:spcBef>
-                <a:spcPct val="30000"/>
-              </a:spcBef>
-              <a:buFont typeface="Arial" panose="020B0604020202020204" pitchFamily="34" charset="0"/>
-              <a:buChar char="•"/>
-              <a:defRPr sz="1800" kern="1200">
-                <a:solidFill>
-                  <a:schemeClr val="tx1"/>
-                </a:solidFill>
-                <a:latin typeface="+mn-lt"/>
-                <a:ea typeface="+mn-ea"/>
-                <a:cs typeface="+mn-cs"/>
-              </a:defRPr>
-            </a:lvl9pPr>
-          </a:lstStyle>
-          <a:p>
-            <a:pPr marL="0" lvl="0" indent="0">
-              <a:spcAft>
-                <a:spcPts val="600"/>
-              </a:spcAft>
-              <a:buNone/>
-              <a:defRPr/>
-            </a:pPr>
-            <a:endParaRPr lang="en-US" sz="1600" dirty="0">
-              <a:cs typeface="Segoe UI" panose="020B0502040204020203" pitchFamily="34" charset="0"/>
-            </a:endParaRPr>
-          </a:p>
-          <a:p>
-            <a:pPr marL="0" indent="0">
-              <a:buNone/>
-            </a:pPr>
-            <a:r>
-              <a:rPr lang="en-US" sz="1600" dirty="0">
-                <a:solidFill>
-                  <a:schemeClr val="accent4"/>
-                </a:solidFill>
-              </a:rPr>
-              <a:t>Objective:</a:t>
-            </a:r>
-          </a:p>
-          <a:p>
-            <a:r>
-              <a:rPr lang="en-US" sz="1600" dirty="0">
-                <a:solidFill>
-                  <a:schemeClr val="tx1"/>
-                </a:solidFill>
-                <a:cs typeface="Segoe UI" panose="020B0502040204020203" pitchFamily="34" charset="0"/>
-              </a:rPr>
-              <a:t>Principle suggests the inversion of various types of controls in object-oriented design to achieve loose coupling between the application classes. </a:t>
-            </a:r>
-          </a:p>
-          <a:p>
-            <a:r>
-              <a:rPr lang="en-US" sz="1600" dirty="0">
-                <a:solidFill>
-                  <a:schemeClr val="tx1"/>
-                </a:solidFill>
-                <a:cs typeface="Segoe UI" panose="020B0502040204020203" pitchFamily="34" charset="0"/>
-              </a:rPr>
-              <a:t>Here, the control means any extra responsibilities a class has other than its main or fundamental responsibility. For example, control over the flow of an application, control over the dependent object creation</a:t>
-            </a:r>
-          </a:p>
-          <a:p>
-            <a:pPr marL="0" indent="0">
-              <a:spcAft>
-                <a:spcPts val="600"/>
-              </a:spcAft>
-              <a:buNone/>
-              <a:defRPr/>
-            </a:pPr>
-            <a:r>
-              <a:rPr lang="en-US" sz="1600" dirty="0">
-                <a:solidFill>
-                  <a:schemeClr val="accent4"/>
-                </a:solidFill>
-                <a:cs typeface="Segoe UI" panose="020B0502040204020203" pitchFamily="34" charset="0"/>
-              </a:rPr>
-              <a:t>Benefit:</a:t>
-            </a:r>
-            <a:r>
-              <a:rPr lang="en-US" sz="1600" b="1" dirty="0">
-                <a:cs typeface="Segoe UI" panose="020B0502040204020203" pitchFamily="34" charset="0"/>
-              </a:rPr>
-              <a:t> </a:t>
-            </a:r>
-          </a:p>
-          <a:p>
-            <a:pPr>
-              <a:spcAft>
-                <a:spcPts val="600"/>
-              </a:spcAft>
-              <a:defRPr/>
-            </a:pPr>
-            <a:r>
-              <a:rPr lang="en-US" sz="1600" dirty="0">
-                <a:cs typeface="Segoe UI" panose="020B0502040204020203" pitchFamily="34" charset="0"/>
-              </a:rPr>
-              <a:t>Decouple components of an application.</a:t>
-            </a:r>
-          </a:p>
-        </p:txBody>
-      </p:sp>
     </p:spTree>
     <p:extLst>
       <p:ext uri="{BB962C8B-B14F-4D97-AF65-F5344CB8AC3E}">
-        <p14:creationId xmlns:p14="http://schemas.microsoft.com/office/powerpoint/2010/main" val="184464248"/>
-      </p:ext>
-    </p:extLst>
-  </p:cSld>
-  <p:clrMapOvr>
-    <a:masterClrMapping/>
-  </p:clrMapOvr>
-  <mc:AlternateContent xmlns:mc="http://schemas.openxmlformats.org/markup-compatibility/2006" xmlns:p14="http://schemas.microsoft.com/office/powerpoint/2010/main">
-    <mc:Choice Requires="p14">
-      <p:transition p14:dur="10"/>
-    </mc:Choice>
-    <mc:Fallback xmlns="">
-      <p:transition/>
-    </mc:Fallback>
-  </mc:AlternateContent>
-</p:sld>
-</file>
-
-<file path=ppt/slides/slide9.xml><?xml version="1.0" encoding="utf-8"?>
-<p:sld xmlns:a="http://schemas.openxmlformats.org/drawingml/2006/main" xmlns:r="http://schemas.openxmlformats.org/officeDocument/2006/relationships" xmlns:p="http://schemas.openxmlformats.org/presentationml/2006/main">
-  <p:cSld>
-    <p:spTree>
-      <p:nvGrpSpPr>
-        <p:cNvPr id="1" name=""/>
-        <p:cNvGrpSpPr/>
-        <p:nvPr/>
-      </p:nvGrpSpPr>
-      <p:grpSpPr>
-        <a:xfrm>
-          <a:off x="0" y="0"/>
-          <a:ext cx="0" cy="0"/>
-          <a:chOff x="0" y="0"/>
-          <a:chExt cx="0" cy="0"/>
-        </a:xfrm>
-      </p:grpSpPr>
-      <p:sp>
-        <p:nvSpPr>
-          <p:cNvPr id="8" name="Title 7"/>
-          <p:cNvSpPr>
-            <a:spLocks noGrp="1"/>
-          </p:cNvSpPr>
-          <p:nvPr>
-            <p:ph type="title"/>
-          </p:nvPr>
-        </p:nvSpPr>
-        <p:spPr>
-          <a:xfrm>
-            <a:off x="521207" y="448056"/>
-            <a:ext cx="7658059" cy="640080"/>
-          </a:xfrm>
-        </p:spPr>
-        <p:txBody>
-          <a:bodyPr>
-            <a:noAutofit/>
-          </a:bodyPr>
-          <a:lstStyle/>
-          <a:p>
-            <a:r>
-              <a:rPr lang="en-US" dirty="0">
-                <a:latin typeface="Segoe UI Light" panose="020B0502040204020203" pitchFamily="34" charset="0"/>
-                <a:cs typeface="Segoe UI Light" panose="020B0502040204020203" pitchFamily="34" charset="0"/>
-              </a:rPr>
-              <a:t>DEPENDENCY INJECTION</a:t>
-            </a:r>
-          </a:p>
-        </p:txBody>
-      </p:sp>
-      <p:sp>
-        <p:nvSpPr>
-          <p:cNvPr id="38" name="Content Placeholder 17"/>
-          <p:cNvSpPr txBox="1">
-            <a:spLocks/>
-          </p:cNvSpPr>
-          <p:nvPr/>
-        </p:nvSpPr>
-        <p:spPr>
-          <a:xfrm>
-            <a:off x="521205" y="1285570"/>
-            <a:ext cx="5574795" cy="5470337"/>
-          </a:xfrm>
-          <a:prstGeom prst="rect">
-            <a:avLst/>
-          </a:prstGeom>
-        </p:spPr>
-        <p:txBody>
-          <a:bodyPr vert="horz" lIns="91440" tIns="45720" rIns="91440" bIns="45720" rtlCol="0">
-            <a:normAutofit fontScale="25000" lnSpcReduction="20000"/>
-          </a:bodyPr>
-          <a:lstStyle>
-            <a:lvl1pPr marL="228600" indent="-228600" algn="l" defTabSz="914400" rtl="0" eaLnBrk="1" latinLnBrk="0" hangingPunct="1">
-              <a:lnSpc>
-                <a:spcPts val="1800"/>
-              </a:lnSpc>
-              <a:spcBef>
-                <a:spcPts val="1000"/>
-              </a:spcBef>
-              <a:spcAft>
-                <a:spcPts val="1000"/>
-              </a:spcAft>
-              <a:buFont typeface="Arial" panose="020B0604020202020204" pitchFamily="34" charset="0"/>
-              <a:buChar char="•"/>
-              <a:defRPr lang="en-US" sz="1200" kern="1200" smtClean="0">
-                <a:solidFill>
-                  <a:schemeClr val="tx1">
-                    <a:lumMod val="75000"/>
-                    <a:lumOff val="25000"/>
-                  </a:schemeClr>
-                </a:solidFill>
-                <a:latin typeface="+mn-lt"/>
-                <a:ea typeface="+mn-ea"/>
-                <a:cs typeface="+mn-cs"/>
-              </a:defRPr>
-            </a:lvl1pPr>
-            <a:lvl2pPr marL="685800" indent="-228600" algn="l" defTabSz="914400" rtl="0" eaLnBrk="1" latinLnBrk="0" hangingPunct="1">
-              <a:lnSpc>
-                <a:spcPts val="1800"/>
-              </a:lnSpc>
-              <a:spcBef>
-                <a:spcPts val="1000"/>
-              </a:spcBef>
-              <a:spcAft>
-                <a:spcPts val="1000"/>
-              </a:spcAft>
-              <a:buFont typeface="Arial" panose="020B0604020202020204" pitchFamily="34" charset="0"/>
-              <a:buChar char="•"/>
-              <a:defRPr lang="en-US" sz="1200" kern="1200" smtClean="0">
-                <a:solidFill>
-                  <a:schemeClr val="tx1">
-                    <a:lumMod val="75000"/>
-                    <a:lumOff val="25000"/>
-                  </a:schemeClr>
-                </a:solidFill>
-                <a:latin typeface="+mn-lt"/>
-                <a:ea typeface="+mn-ea"/>
-                <a:cs typeface="+mn-cs"/>
-              </a:defRPr>
-            </a:lvl2pPr>
-            <a:lvl3pPr marL="1143000" indent="-228600" algn="l" defTabSz="914400" rtl="0" eaLnBrk="1" latinLnBrk="0" hangingPunct="1">
-              <a:lnSpc>
-                <a:spcPts val="1800"/>
-              </a:lnSpc>
-              <a:spcBef>
-                <a:spcPts val="1000"/>
-              </a:spcBef>
-              <a:spcAft>
-                <a:spcPts val="1000"/>
-              </a:spcAft>
-              <a:buFont typeface="Arial" panose="020B0604020202020204" pitchFamily="34" charset="0"/>
-              <a:buChar char="•"/>
-              <a:defRPr lang="en-US" sz="1200" kern="1200" smtClean="0">
-                <a:solidFill>
-                  <a:schemeClr val="tx1">
-                    <a:lumMod val="75000"/>
-                    <a:lumOff val="25000"/>
-                  </a:schemeClr>
-                </a:solidFill>
-                <a:latin typeface="+mn-lt"/>
-                <a:ea typeface="+mn-ea"/>
-                <a:cs typeface="+mn-cs"/>
-              </a:defRPr>
-            </a:lvl3pPr>
-            <a:lvl4pPr marL="1600200" indent="-228600" algn="l" defTabSz="914400" rtl="0" eaLnBrk="1" latinLnBrk="0" hangingPunct="1">
-              <a:lnSpc>
-                <a:spcPts val="1800"/>
-              </a:lnSpc>
-              <a:spcBef>
-                <a:spcPts val="1000"/>
-              </a:spcBef>
-              <a:spcAft>
-                <a:spcPts val="1000"/>
-              </a:spcAft>
-              <a:buFont typeface="Arial" panose="020B0604020202020204" pitchFamily="34" charset="0"/>
-              <a:buChar char="•"/>
-              <a:defRPr lang="en-US" sz="1200" kern="1200" smtClean="0">
-                <a:solidFill>
-                  <a:schemeClr val="tx1">
-                    <a:lumMod val="75000"/>
-                    <a:lumOff val="25000"/>
-                  </a:schemeClr>
-                </a:solidFill>
-                <a:latin typeface="+mn-lt"/>
-                <a:ea typeface="+mn-ea"/>
-                <a:cs typeface="+mn-cs"/>
-              </a:defRPr>
-            </a:lvl4pPr>
-            <a:lvl5pPr marL="2057400" indent="-228600" algn="l" defTabSz="914400" rtl="0" eaLnBrk="1" latinLnBrk="0" hangingPunct="1">
-              <a:lnSpc>
-                <a:spcPts val="1800"/>
-              </a:lnSpc>
-              <a:spcBef>
-                <a:spcPts val="1000"/>
-              </a:spcBef>
-              <a:spcAft>
-                <a:spcPts val="1000"/>
-              </a:spcAft>
-              <a:buFont typeface="Arial" panose="020B0604020202020204" pitchFamily="34" charset="0"/>
-              <a:buChar char="•"/>
-              <a:defRPr lang="en-US" sz="1200" kern="1200">
-                <a:solidFill>
-                  <a:schemeClr val="tx1">
-                    <a:lumMod val="75000"/>
-                    <a:lumOff val="25000"/>
-                  </a:schemeClr>
-                </a:solidFill>
-                <a:latin typeface="+mn-lt"/>
-                <a:ea typeface="+mn-ea"/>
-                <a:cs typeface="+mn-cs"/>
-              </a:defRPr>
-            </a:lvl5pPr>
-            <a:lvl6pPr marL="2514600" indent="-228600" algn="l" defTabSz="914400" rtl="0" eaLnBrk="1" latinLnBrk="0" hangingPunct="1">
-              <a:lnSpc>
-                <a:spcPct val="90000"/>
-              </a:lnSpc>
-              <a:spcBef>
-                <a:spcPct val="30000"/>
-              </a:spcBef>
-              <a:buFont typeface="Arial" panose="020B0604020202020204" pitchFamily="34" charset="0"/>
-              <a:buChar char="•"/>
-              <a:defRPr sz="1800" kern="1200">
-                <a:solidFill>
-                  <a:schemeClr val="tx1"/>
-                </a:solidFill>
-                <a:latin typeface="+mn-lt"/>
-                <a:ea typeface="+mn-ea"/>
-                <a:cs typeface="+mn-cs"/>
-              </a:defRPr>
-            </a:lvl6pPr>
-            <a:lvl7pPr marL="2971800" indent="-228600" algn="l" defTabSz="914400" rtl="0" eaLnBrk="1" latinLnBrk="0" hangingPunct="1">
-              <a:lnSpc>
-                <a:spcPct val="90000"/>
-              </a:lnSpc>
-              <a:spcBef>
-                <a:spcPct val="30000"/>
-              </a:spcBef>
-              <a:buFont typeface="Arial" panose="020B0604020202020204" pitchFamily="34" charset="0"/>
-              <a:buChar char="•"/>
-              <a:defRPr sz="1800" kern="1200">
-                <a:solidFill>
-                  <a:schemeClr val="tx1"/>
-                </a:solidFill>
-                <a:latin typeface="+mn-lt"/>
-                <a:ea typeface="+mn-ea"/>
-                <a:cs typeface="+mn-cs"/>
-              </a:defRPr>
-            </a:lvl7pPr>
-            <a:lvl8pPr marL="3429000" indent="-228600" algn="l" defTabSz="914400" rtl="0" eaLnBrk="1" latinLnBrk="0" hangingPunct="1">
-              <a:lnSpc>
-                <a:spcPct val="90000"/>
-              </a:lnSpc>
-              <a:spcBef>
-                <a:spcPct val="30000"/>
-              </a:spcBef>
-              <a:buFont typeface="Arial" panose="020B0604020202020204" pitchFamily="34" charset="0"/>
-              <a:buChar char="•"/>
-              <a:defRPr sz="1800" kern="1200">
-                <a:solidFill>
-                  <a:schemeClr val="tx1"/>
-                </a:solidFill>
-                <a:latin typeface="+mn-lt"/>
-                <a:ea typeface="+mn-ea"/>
-                <a:cs typeface="+mn-cs"/>
-              </a:defRPr>
-            </a:lvl8pPr>
-            <a:lvl9pPr marL="3886200" indent="-228600" algn="l" defTabSz="914400" rtl="0" eaLnBrk="1" latinLnBrk="0" hangingPunct="1">
-              <a:lnSpc>
-                <a:spcPct val="90000"/>
-              </a:lnSpc>
-              <a:spcBef>
-                <a:spcPct val="30000"/>
-              </a:spcBef>
-              <a:buFont typeface="Arial" panose="020B0604020202020204" pitchFamily="34" charset="0"/>
-              <a:buChar char="•"/>
-              <a:defRPr sz="1800" kern="1200">
-                <a:solidFill>
-                  <a:schemeClr val="tx1"/>
-                </a:solidFill>
-                <a:latin typeface="+mn-lt"/>
-                <a:ea typeface="+mn-ea"/>
-                <a:cs typeface="+mn-cs"/>
-              </a:defRPr>
-            </a:lvl9pPr>
-          </a:lstStyle>
-          <a:p>
-            <a:pPr marL="0" lvl="0" indent="0">
-              <a:spcAft>
-                <a:spcPts val="600"/>
-              </a:spcAft>
-              <a:buNone/>
-              <a:defRPr/>
-            </a:pPr>
-            <a:endParaRPr lang="en-US" dirty="0">
-              <a:latin typeface="Segoe UI" panose="020B0502040204020203" pitchFamily="34" charset="0"/>
-              <a:cs typeface="Segoe UI" panose="020B0502040204020203" pitchFamily="34" charset="0"/>
-            </a:endParaRPr>
-          </a:p>
-          <a:p>
-            <a:pPr marL="0" lvl="0" indent="0">
-              <a:spcAft>
-                <a:spcPts val="600"/>
-              </a:spcAft>
-              <a:buNone/>
-              <a:defRPr/>
-            </a:pPr>
-            <a:r>
-              <a:rPr lang="en-US" sz="6400" dirty="0">
-                <a:solidFill>
-                  <a:schemeClr val="accent4"/>
-                </a:solidFill>
-                <a:latin typeface="Segoe UI" panose="020B0502040204020203" pitchFamily="34" charset="0"/>
-                <a:cs typeface="Segoe UI" panose="020B0502040204020203" pitchFamily="34" charset="0"/>
-              </a:rPr>
-              <a:t>Types of Dependency Injection:</a:t>
-            </a:r>
-          </a:p>
-          <a:p>
-            <a:pPr>
-              <a:spcAft>
-                <a:spcPts val="600"/>
-              </a:spcAft>
-              <a:defRPr/>
-            </a:pPr>
-            <a:r>
-              <a:rPr lang="en-IN" sz="6400" b="0" i="0" dirty="0">
-                <a:solidFill>
-                  <a:srgbClr val="4466C5"/>
-                </a:solidFill>
-                <a:effectLst/>
-                <a:latin typeface="Segoe UI" panose="020B0502040204020203" pitchFamily="34" charset="0"/>
-              </a:rPr>
-              <a:t>Constructor Injection</a:t>
-            </a:r>
-          </a:p>
-          <a:p>
-            <a:pPr>
-              <a:spcAft>
-                <a:spcPts val="600"/>
-              </a:spcAft>
-              <a:defRPr/>
-            </a:pPr>
-            <a:r>
-              <a:rPr lang="en-IN" sz="6400" b="0" i="0" dirty="0">
-                <a:solidFill>
-                  <a:srgbClr val="4466C5"/>
-                </a:solidFill>
-                <a:effectLst/>
-                <a:latin typeface="Segoe UI" panose="020B0502040204020203" pitchFamily="34" charset="0"/>
-              </a:rPr>
-              <a:t>Property/Setter Injection</a:t>
-            </a:r>
-          </a:p>
-          <a:p>
-            <a:pPr>
-              <a:spcAft>
-                <a:spcPts val="600"/>
-              </a:spcAft>
-              <a:defRPr/>
-            </a:pPr>
-            <a:r>
-              <a:rPr lang="en-IN" sz="6400" b="0" i="0" dirty="0">
-                <a:solidFill>
-                  <a:srgbClr val="4466C5"/>
-                </a:solidFill>
-                <a:effectLst/>
-                <a:latin typeface="Segoe UI" panose="020B0502040204020203" pitchFamily="34" charset="0"/>
-              </a:rPr>
-              <a:t>Method Injection</a:t>
-            </a:r>
-            <a:endParaRPr lang="en-IN" sz="6400" dirty="0">
-              <a:solidFill>
-                <a:srgbClr val="4466C5"/>
-              </a:solidFill>
-              <a:latin typeface="Segoe UI" panose="020B0502040204020203" pitchFamily="34" charset="0"/>
-            </a:endParaRPr>
-          </a:p>
-          <a:p>
-            <a:pPr marL="0" indent="0">
-              <a:spcAft>
-                <a:spcPts val="600"/>
-              </a:spcAft>
-              <a:buNone/>
-              <a:defRPr/>
-            </a:pPr>
-            <a:r>
-              <a:rPr lang="en-IN" sz="6400" b="0" i="0" dirty="0">
-                <a:solidFill>
-                  <a:schemeClr val="accent4"/>
-                </a:solidFill>
-                <a:effectLst/>
-                <a:latin typeface="Segoe UI" panose="020B0502040204020203" pitchFamily="34" charset="0"/>
-              </a:rPr>
-              <a:t>Benefit:</a:t>
-            </a:r>
-          </a:p>
-          <a:p>
-            <a:pPr>
-              <a:spcAft>
-                <a:spcPts val="600"/>
-              </a:spcAft>
-              <a:defRPr/>
-            </a:pPr>
-            <a:r>
-              <a:rPr lang="en-IN" sz="6400" b="0" i="0" dirty="0">
-                <a:solidFill>
-                  <a:srgbClr val="161616"/>
-                </a:solidFill>
-                <a:effectLst/>
-                <a:latin typeface="Segoe UI" panose="020B0502040204020203" pitchFamily="34" charset="0"/>
-              </a:rPr>
-              <a:t>Reduces class coupling.</a:t>
-            </a:r>
-          </a:p>
-          <a:p>
-            <a:pPr>
-              <a:spcAft>
-                <a:spcPts val="600"/>
-              </a:spcAft>
-              <a:defRPr/>
-            </a:pPr>
-            <a:r>
-              <a:rPr lang="en-IN" sz="6400" b="0" i="0" dirty="0">
-                <a:solidFill>
-                  <a:srgbClr val="161616"/>
-                </a:solidFill>
-                <a:effectLst/>
-                <a:latin typeface="Segoe UI" panose="020B0502040204020203" pitchFamily="34" charset="0"/>
-              </a:rPr>
-              <a:t>Increases code reusability.</a:t>
-            </a:r>
-          </a:p>
-          <a:p>
-            <a:pPr>
-              <a:spcAft>
-                <a:spcPts val="600"/>
-              </a:spcAft>
-              <a:defRPr/>
-            </a:pPr>
-            <a:r>
-              <a:rPr lang="en-IN" sz="6400" b="0" i="0" dirty="0">
-                <a:solidFill>
-                  <a:srgbClr val="161616"/>
-                </a:solidFill>
-                <a:effectLst/>
-                <a:latin typeface="Segoe UI" panose="020B0502040204020203" pitchFamily="34" charset="0"/>
-              </a:rPr>
-              <a:t>Improves code maintainability</a:t>
-            </a:r>
-          </a:p>
-          <a:p>
-            <a:pPr>
-              <a:spcAft>
-                <a:spcPts val="600"/>
-              </a:spcAft>
-              <a:defRPr/>
-            </a:pPr>
-            <a:r>
-              <a:rPr lang="en-IN" sz="6400" b="0" i="0" dirty="0">
-                <a:solidFill>
-                  <a:srgbClr val="161616"/>
-                </a:solidFill>
-                <a:effectLst/>
-                <a:latin typeface="Segoe UI" panose="020B0502040204020203" pitchFamily="34" charset="0"/>
-              </a:rPr>
-              <a:t>Make unit testing possible.</a:t>
-            </a:r>
-          </a:p>
-          <a:p>
-            <a:pPr>
-              <a:spcAft>
-                <a:spcPts val="600"/>
-              </a:spcAft>
-              <a:defRPr/>
-            </a:pPr>
-            <a:endParaRPr lang="en-IN" b="0" i="0" dirty="0">
-              <a:solidFill>
-                <a:srgbClr val="161616"/>
-              </a:solidFill>
-              <a:effectLst/>
-              <a:latin typeface="Segoe UI" panose="020B0502040204020203" pitchFamily="34" charset="0"/>
-            </a:endParaRPr>
-          </a:p>
-          <a:p>
-            <a:pPr marL="0" indent="0">
-              <a:spcAft>
-                <a:spcPts val="600"/>
-              </a:spcAft>
-              <a:buNone/>
-              <a:defRPr/>
-            </a:pPr>
-            <a:endParaRPr lang="en-IN" b="0" i="0" dirty="0">
-              <a:solidFill>
-                <a:schemeClr val="accent4"/>
-              </a:solidFill>
-              <a:effectLst/>
-              <a:latin typeface="Segoe UI" panose="020B0502040204020203" pitchFamily="34" charset="0"/>
-            </a:endParaRPr>
-          </a:p>
-          <a:p>
-            <a:pPr marL="0" indent="0">
-              <a:spcAft>
-                <a:spcPts val="600"/>
-              </a:spcAft>
-              <a:buNone/>
-              <a:defRPr/>
-            </a:pPr>
-            <a:endParaRPr lang="en-US" b="1" dirty="0">
-              <a:solidFill>
-                <a:schemeClr val="tx1"/>
-              </a:solidFill>
-              <a:latin typeface="Segoe UI" panose="020B0502040204020203" pitchFamily="34" charset="0"/>
-              <a:cs typeface="Segoe UI" panose="020B0502040204020203" pitchFamily="34" charset="0"/>
-            </a:endParaRPr>
-          </a:p>
-          <a:p>
-            <a:pPr marL="0" indent="0">
-              <a:spcAft>
-                <a:spcPts val="600"/>
-              </a:spcAft>
-              <a:buNone/>
-              <a:defRPr/>
-            </a:pPr>
-            <a:r>
-              <a:rPr lang="en-US" b="1" dirty="0">
-                <a:latin typeface="Segoe UI" panose="020B0502040204020203" pitchFamily="34" charset="0"/>
-                <a:cs typeface="Segoe UI" panose="020B0502040204020203" pitchFamily="34" charset="0"/>
-              </a:rPr>
-              <a:t> </a:t>
-            </a:r>
-            <a:endParaRPr lang="en-US" dirty="0">
-              <a:latin typeface="Segoe UI" panose="020B0502040204020203" pitchFamily="34" charset="0"/>
-              <a:cs typeface="Segoe UI" panose="020B0502040204020203" pitchFamily="34" charset="0"/>
-            </a:endParaRPr>
-          </a:p>
-        </p:txBody>
-      </p:sp>
-      <p:pic>
-        <p:nvPicPr>
-          <p:cNvPr id="3" name="Picture 2">
-            <a:extLst>
-              <a:ext uri="{FF2B5EF4-FFF2-40B4-BE49-F238E27FC236}">
-                <a16:creationId xmlns:a16="http://schemas.microsoft.com/office/drawing/2014/main" id="{A77479DA-A4C8-9392-41C4-6F825CFFD9B1}"/>
-              </a:ext>
-            </a:extLst>
-          </p:cNvPr>
-          <p:cNvPicPr>
-            <a:picLocks noChangeAspect="1"/>
-          </p:cNvPicPr>
-          <p:nvPr/>
-        </p:nvPicPr>
-        <p:blipFill>
-          <a:blip r:embed="rId2"/>
-          <a:stretch>
-            <a:fillRect/>
-          </a:stretch>
-        </p:blipFill>
-        <p:spPr>
-          <a:xfrm>
-            <a:off x="5607698" y="1285569"/>
-            <a:ext cx="5918561" cy="2699575"/>
-          </a:xfrm>
-          <a:prstGeom prst="rect">
-            <a:avLst/>
-          </a:prstGeom>
-        </p:spPr>
-      </p:pic>
-      <p:pic>
-        <p:nvPicPr>
-          <p:cNvPr id="5" name="Picture 4">
-            <a:extLst>
-              <a:ext uri="{FF2B5EF4-FFF2-40B4-BE49-F238E27FC236}">
-                <a16:creationId xmlns:a16="http://schemas.microsoft.com/office/drawing/2014/main" id="{827108ED-89EE-BBF9-75DD-E206D59FCEDF}"/>
-              </a:ext>
-            </a:extLst>
-          </p:cNvPr>
-          <p:cNvPicPr>
-            <a:picLocks noChangeAspect="1"/>
-          </p:cNvPicPr>
-          <p:nvPr/>
-        </p:nvPicPr>
-        <p:blipFill>
-          <a:blip r:embed="rId3"/>
-          <a:stretch>
-            <a:fillRect/>
-          </a:stretch>
-        </p:blipFill>
-        <p:spPr>
-          <a:xfrm>
-            <a:off x="5309118" y="4019049"/>
-            <a:ext cx="6361677" cy="2390895"/>
-          </a:xfrm>
-          <a:prstGeom prst="rect">
-            <a:avLst/>
-          </a:prstGeom>
-        </p:spPr>
-      </p:pic>
-    </p:spTree>
-    <p:extLst>
-      <p:ext uri="{BB962C8B-B14F-4D97-AF65-F5344CB8AC3E}">
-        <p14:creationId xmlns:p14="http://schemas.microsoft.com/office/powerpoint/2010/main" val="2609524556"/>
+        <p14:creationId xmlns:p14="http://schemas.microsoft.com/office/powerpoint/2010/main" val="1195684305"/>
       </p:ext>
     </p:extLst>
   </p:cSld>

</xml_diff>